<commit_message>
PPT - Changes mainly in comments
</commit_message>
<xml_diff>
--- a/חומר עזר לפרויקט/project_A.pptx
+++ b/חומר עזר לפרויקט/project_A.pptx
@@ -6,10 +6,10 @@
     <p:sldMasterId id="2147483660" r:id="rId2"/>
   </p:sldMasterIdLst>
   <p:notesMasterIdLst>
-    <p:notesMasterId r:id="rId33"/>
+    <p:notesMasterId r:id="rId34"/>
   </p:notesMasterIdLst>
   <p:handoutMasterIdLst>
-    <p:handoutMasterId r:id="rId34"/>
+    <p:handoutMasterId r:id="rId35"/>
   </p:handoutMasterIdLst>
   <p:sldIdLst>
     <p:sldId id="257" r:id="rId3"/>
@@ -35,13 +35,14 @@
     <p:sldId id="277" r:id="rId23"/>
     <p:sldId id="278" r:id="rId24"/>
     <p:sldId id="279" r:id="rId25"/>
-    <p:sldId id="280" r:id="rId26"/>
-    <p:sldId id="281" r:id="rId27"/>
-    <p:sldId id="282" r:id="rId28"/>
-    <p:sldId id="264" r:id="rId29"/>
-    <p:sldId id="283" r:id="rId30"/>
-    <p:sldId id="284" r:id="rId31"/>
-    <p:sldId id="265" r:id="rId32"/>
+    <p:sldId id="292" r:id="rId26"/>
+    <p:sldId id="280" r:id="rId27"/>
+    <p:sldId id="281" r:id="rId28"/>
+    <p:sldId id="282" r:id="rId29"/>
+    <p:sldId id="264" r:id="rId30"/>
+    <p:sldId id="283" r:id="rId31"/>
+    <p:sldId id="284" r:id="rId32"/>
+    <p:sldId id="265" r:id="rId33"/>
   </p:sldIdLst>
   <p:sldSz cx="12192000" cy="6858000"/>
   <p:notesSz cx="6858000" cy="9144000"/>
@@ -6996,8 +6997,8 @@
               <a:t>ה-</a:t>
             </a:r>
             <a:r>
-              <a:rPr lang="en-US" dirty="0" err="1"/>
-              <a:t>exeutor</a:t>
+              <a:rPr lang="en-US" dirty="0"/>
+              <a:t>executor</a:t>
             </a:r>
             <a:r>
               <a:rPr lang="he-IL" dirty="0"/>
@@ -7123,13 +7124,9 @@
           <a:bodyPr/>
           <a:lstStyle/>
           <a:p>
-            <a:pPr marL="171450" indent="-171450">
-              <a:buFontTx/>
-              <a:buChar char="-"/>
-            </a:pPr>
             <a:r>
               <a:rPr lang="he-IL" dirty="0"/>
-              <a:t>אנחנו מקבלים תוכנית (</a:t>
+              <a:t>בפרויקט התעסקנו בעיקר במתיחת גרף ה-</a:t>
             </a:r>
             <a:r>
               <a:rPr lang="en-US" dirty="0"/>
@@ -7137,178 +7134,24 @@
             </a:r>
             <a:r>
               <a:rPr lang="he-IL" dirty="0"/>
-              <a:t>) מהזמן אופליין.</a:t>
-            </a:r>
-          </a:p>
-          <a:p>
-            <a:pPr marL="171450" indent="-171450">
-              <a:buFontTx/>
-              <a:buChar char="-"/>
-            </a:pPr>
+              <a:t> – כלומר, בהפרעה של עיכוב או דחייה של פעולה מסוימת (למשל משימה של מטוס שהתארכה, המראה שהתעכבה) ואיך עיכוב זה השפיע על שאר סדר היום והשינויים הנצרכים בזמן-אמת.</a:t>
+            </a:r>
+          </a:p>
+          <a:p>
             <a:r>
               <a:rPr lang="he-IL" dirty="0"/>
-              <a:t>התוכנית פעולה נכנסת למנהל התכנית והוא דואג לייצר את </a:t>
+              <a:t>בפרויקט הנחנו כי תכנון </a:t>
             </a:r>
             <a:r>
               <a:rPr lang="he-IL" dirty="0" err="1"/>
-              <a:t>המודולוים</a:t>
+              <a:t>האופליין</a:t>
             </a:r>
             <a:r>
               <a:rPr lang="he-IL" dirty="0"/>
-              <a:t> השונים והקשרים ביניהם.</a:t>
-            </a:r>
-          </a:p>
-          <a:p>
-            <a:pPr marL="171450" indent="-171450">
-              <a:buFontTx/>
-              <a:buChar char="-"/>
-            </a:pPr>
-            <a:r>
-              <a:rPr lang="he-IL" dirty="0"/>
-              <a:t>הבקר מקבל את קובץ </a:t>
-            </a:r>
-            <a:r>
-              <a:rPr lang="he-IL" dirty="0" err="1"/>
-              <a:t>הקונפיג</a:t>
-            </a:r>
-            <a:r>
-              <a:rPr lang="he-IL" dirty="0"/>
-              <a:t> </a:t>
-            </a:r>
-            <a:r>
-              <a:rPr lang="he-IL" dirty="0" err="1"/>
-              <a:t>והתכנית</a:t>
-            </a:r>
-            <a:r>
-              <a:rPr lang="he-IL" dirty="0"/>
-              <a:t> (</a:t>
-            </a:r>
-            <a:r>
-              <a:rPr lang="en-US" dirty="0"/>
-              <a:t>STN</a:t>
-            </a:r>
-            <a:r>
-              <a:rPr lang="he-IL" dirty="0"/>
-              <a:t>) ותפקידו לשמש כמגדל בקרה ופיקוח.</a:t>
-            </a:r>
-          </a:p>
-          <a:p>
-            <a:pPr marL="171450" indent="-171450">
-              <a:buFontTx/>
-              <a:buChar char="-"/>
-            </a:pPr>
-            <a:r>
-              <a:rPr lang="he-IL" dirty="0"/>
-              <a:t>הסימולטור משמש כמודל לעולם אשר מריץ את הפעולות ונותן אינדיקציה כאשר פעולות הסתיימו.</a:t>
-            </a:r>
-          </a:p>
-          <a:p>
-            <a:pPr marL="171450" indent="-171450">
-              <a:buFontTx/>
-              <a:buChar char="-"/>
-            </a:pPr>
-            <a:r>
-              <a:rPr lang="he-IL" dirty="0"/>
-              <a:t>מודול מצב העולם (</a:t>
-            </a:r>
-            <a:r>
-              <a:rPr lang="en-US" dirty="0"/>
-              <a:t>state</a:t>
-            </a:r>
-            <a:r>
-              <a:rPr lang="he-IL" dirty="0"/>
-              <a:t>) מייצג תמונה של מצב כל המטוסים, נתיבים ושאר הפרמטרים אחריהם אנו עוקבים – מקבל </a:t>
-            </a:r>
-            <a:r>
-              <a:rPr lang="he-IL" dirty="0" err="1"/>
-              <a:t>עידכונים</a:t>
-            </a:r>
-            <a:r>
-              <a:rPr lang="he-IL" dirty="0"/>
-              <a:t> מהסימולטור על כל התחלה\סיום של פעולה.</a:t>
-            </a:r>
-          </a:p>
-          <a:p>
-            <a:pPr marL="171450" indent="-171450">
-              <a:buFontTx/>
-              <a:buChar char="-"/>
-            </a:pPr>
-            <a:r>
-              <a:rPr lang="he-IL" dirty="0"/>
-              <a:t>מודול ההפרעות – בוחר באופן רנדומלי כל מספר פעולות לייצר הפרעה אשר נשלחת לסימולטור עבור פעולה כלשהי.</a:t>
-            </a:r>
-          </a:p>
-          <a:p>
-            <a:pPr marL="171450" indent="-171450">
-              <a:buFontTx/>
-              <a:buChar char="-"/>
-            </a:pPr>
-            <a:r>
-              <a:rPr lang="he-IL" dirty="0"/>
-              <a:t>שעון – מודול גלובלי אשר סופר זמן באופן דיסקרטי.</a:t>
-            </a:r>
-          </a:p>
-          <a:p>
-            <a:pPr marL="171450" indent="-171450">
-              <a:buFontTx/>
-              <a:buChar char="-"/>
-            </a:pPr>
-            <a:r>
-              <a:rPr lang="he-IL" dirty="0"/>
-              <a:t>אירועים – מודול גלובלי אשר משמש כאמצעי תקשורת בין המודולים השונים </a:t>
-            </a:r>
-            <a:r>
-              <a:rPr lang="he-IL" dirty="0" err="1"/>
-              <a:t>בתכנית</a:t>
-            </a:r>
-            <a:r>
-              <a:rPr lang="he-IL" dirty="0"/>
-              <a:t> שלנו.</a:t>
-            </a:r>
-          </a:p>
-          <a:p>
-            <a:pPr marL="171450" indent="-171450">
-              <a:buFontTx/>
-              <a:buChar char="-"/>
-            </a:pPr>
-            <a:endParaRPr lang="he-IL" dirty="0"/>
-          </a:p>
-          <a:p>
-            <a:pPr marL="171450" marR="0" lvl="0" indent="-171450" algn="r" defTabSz="914400" rtl="1" eaLnBrk="1" fontAlgn="auto" latinLnBrk="0" hangingPunct="1">
-              <a:lnSpc>
-                <a:spcPct val="100000"/>
-              </a:lnSpc>
-              <a:spcBef>
-                <a:spcPts val="0"/>
-              </a:spcBef>
-              <a:spcAft>
-                <a:spcPts val="0"/>
-              </a:spcAft>
-              <a:buClrTx/>
-              <a:buSzTx/>
-              <a:buFontTx/>
-              <a:buChar char="-"/>
-              <a:tabLst/>
-              <a:defRPr/>
-            </a:pPr>
-            <a:r>
-              <a:rPr lang="he-IL" dirty="0"/>
-              <a:t>עיקר השינויים היו הוספת מעטפת לפרויקט כדי שנוכל להשתמש בו כחלק מהאלגוריתם שלנו, בעצם, שינינו את הפרויקט כך שיקבל קלט ופלט בצורה שנוכל לייצר </a:t>
-            </a:r>
-            <a:r>
-              <a:rPr lang="he-IL" b="1" dirty="0"/>
-              <a:t>משוב</a:t>
-            </a:r>
-            <a:r>
-              <a:rPr lang="he-IL" dirty="0"/>
-              <a:t> בצורה נוחה.</a:t>
-            </a:r>
-          </a:p>
-          <a:p>
-            <a:pPr marL="171450" indent="-171450">
-              <a:buFontTx/>
-              <a:buChar char="-"/>
-            </a:pPr>
+              <a:t> זניח, ולכן בעת ביצוע תכנון מחדש הקפאנו את מצב העולם.</a:t>
+            </a:r>
+          </a:p>
+          <a:p>
             <a:endParaRPr lang="he-IL" dirty="0"/>
           </a:p>
         </p:txBody>
@@ -7353,7 +7196,7 @@
           <a:p>
             <a:fld id="{5D87C9B3-3F36-45D2-B699-10C699E739B9}" type="slidenum">
               <a:rPr lang="he-IL" smtClean="0"/>
-              <a:t>12</a:t>
+              <a:t>11</a:t>
             </a:fld>
             <a:endParaRPr lang="he-IL"/>
           </a:p>
@@ -7362,7 +7205,7 @@
     </p:spTree>
     <p:extLst>
       <p:ext uri="{BB962C8B-B14F-4D97-AF65-F5344CB8AC3E}">
-        <p14:creationId xmlns:p14="http://schemas.microsoft.com/office/powerpoint/2010/main" val="850113018"/>
+        <p14:creationId xmlns:p14="http://schemas.microsoft.com/office/powerpoint/2010/main" val="1169753784"/>
       </p:ext>
     </p:extLst>
   </p:cSld>
@@ -7416,15 +7259,13 @@
           <a:bodyPr/>
           <a:lstStyle/>
           <a:p>
+            <a:pPr marL="171450" indent="-171450">
+              <a:buFontTx/>
+              <a:buChar char="-"/>
+            </a:pPr>
             <a:r>
               <a:rPr lang="he-IL" dirty="0"/>
-              <a:t>מנהל התוכנית – מודול אשר אחראי על היצירה והניקוי של המודולים הגלובליים</a:t>
-            </a:r>
-          </a:p>
-          <a:p>
-            <a:r>
-              <a:rPr lang="he-IL" dirty="0"/>
-              <a:t>	   מודול אשר מקשר את הזמן </a:t>
+              <a:t>בדיאגרמה הזו ניתן לראות את הקשר בין אלגוריתם </a:t>
             </a:r>
             <a:r>
               <a:rPr lang="he-IL" dirty="0" err="1"/>
@@ -7432,28 +7273,235 @@
             </a:r>
             <a:r>
               <a:rPr lang="he-IL" dirty="0"/>
-              <a:t> לזמן האונליין.</a:t>
-            </a:r>
-          </a:p>
-          <a:p>
+              <a:t> לאלגוריתם האונליין.</a:t>
+            </a:r>
+          </a:p>
+          <a:p>
+            <a:pPr marL="171450" marR="0" lvl="0" indent="-171450" algn="r" defTabSz="914400" rtl="1" eaLnBrk="1" fontAlgn="auto" latinLnBrk="0" hangingPunct="1">
+              <a:lnSpc>
+                <a:spcPct val="100000"/>
+              </a:lnSpc>
+              <a:spcBef>
+                <a:spcPts val="0"/>
+              </a:spcBef>
+              <a:spcAft>
+                <a:spcPts val="0"/>
+              </a:spcAft>
+              <a:buClrTx/>
+              <a:buSzTx/>
+              <a:buFontTx/>
+              <a:buChar char="-"/>
+              <a:tabLst/>
+              <a:defRPr/>
+            </a:pPr>
             <a:r>
               <a:rPr lang="he-IL" dirty="0"/>
-              <a:t>	   מודול אשר יוצר עבור כל טסט את המודולים </a:t>
+              <a:t>חשוב לציין כי עיקר השינויים שביצענו באלגוריתם </a:t>
             </a:r>
             <a:r>
               <a:rPr lang="he-IL" dirty="0" err="1"/>
-              <a:t>הלוקאללים</a:t>
+              <a:t>האופליין</a:t>
             </a:r>
             <a:r>
               <a:rPr lang="he-IL" dirty="0"/>
-              <a:t> ומקשר ביניהם.</a:t>
-            </a:r>
-          </a:p>
-          <a:p>
-            <a:r>
-              <a:rPr lang="he-IL"/>
-              <a:t>		</a:t>
-            </a:r>
+              <a:t> היו הוספת מעטפת לפרויקט כדי שנוכל לקשר בניהם. בעצם, שינינו את אלגוריתם </a:t>
+            </a:r>
+            <a:r>
+              <a:rPr lang="he-IL" dirty="0" err="1"/>
+              <a:t>האופליין</a:t>
+            </a:r>
+            <a:r>
+              <a:rPr lang="he-IL" dirty="0"/>
+              <a:t> כך שיקבל קלט ופלט בצורה שנוכל לייצר </a:t>
+            </a:r>
+            <a:r>
+              <a:rPr lang="he-IL" b="0" dirty="0"/>
+              <a:t>משוב (כפי שמופיע כאן)</a:t>
+            </a:r>
+            <a:r>
+              <a:rPr lang="he-IL" dirty="0"/>
+              <a:t> בצורה נוחה.</a:t>
+            </a:r>
+          </a:p>
+          <a:p>
+            <a:pPr marL="171450" marR="0" lvl="0" indent="-171450" algn="r" defTabSz="914400" rtl="1" eaLnBrk="1" fontAlgn="auto" latinLnBrk="0" hangingPunct="1">
+              <a:lnSpc>
+                <a:spcPct val="100000"/>
+              </a:lnSpc>
+              <a:spcBef>
+                <a:spcPts val="0"/>
+              </a:spcBef>
+              <a:spcAft>
+                <a:spcPts val="0"/>
+              </a:spcAft>
+              <a:buClrTx/>
+              <a:buSzTx/>
+              <a:buFontTx/>
+              <a:buChar char="-"/>
+              <a:tabLst/>
+              <a:defRPr/>
+            </a:pPr>
+            <a:r>
+              <a:rPr lang="he-IL" dirty="0"/>
+              <a:t>אפשר לראות כי:</a:t>
+            </a:r>
+          </a:p>
+          <a:p>
+            <a:pPr marL="171450" indent="-171450">
+              <a:buFontTx/>
+              <a:buChar char="-"/>
+            </a:pPr>
+            <a:r>
+              <a:rPr lang="he-IL" dirty="0"/>
+              <a:t>אנחנו מקבלים תוכנית (</a:t>
+            </a:r>
+            <a:r>
+              <a:rPr lang="en-US" dirty="0"/>
+              <a:t>STN</a:t>
+            </a:r>
+            <a:r>
+              <a:rPr lang="he-IL" dirty="0"/>
+              <a:t>) מהזמן אופליין.</a:t>
+            </a:r>
+          </a:p>
+          <a:p>
+            <a:pPr marL="171450" indent="-171450">
+              <a:buFontTx/>
+              <a:buChar char="-"/>
+            </a:pPr>
+            <a:r>
+              <a:rPr lang="he-IL" dirty="0"/>
+              <a:t>התוכנית פעולה נכנסת למנהל התכנית והוא דואג לייצר את </a:t>
+            </a:r>
+            <a:r>
+              <a:rPr lang="he-IL" dirty="0" err="1"/>
+              <a:t>המודולוים</a:t>
+            </a:r>
+            <a:r>
+              <a:rPr lang="he-IL" dirty="0"/>
+              <a:t> השונים והקשרים ביניהם.</a:t>
+            </a:r>
+          </a:p>
+          <a:p>
+            <a:pPr marL="171450" indent="-171450">
+              <a:buFontTx/>
+              <a:buChar char="-"/>
+            </a:pPr>
+            <a:r>
+              <a:rPr lang="he-IL" dirty="0"/>
+              <a:t>הבקר מקבל את קובץ </a:t>
+            </a:r>
+            <a:r>
+              <a:rPr lang="he-IL" dirty="0" err="1"/>
+              <a:t>הקונפיג</a:t>
+            </a:r>
+            <a:r>
+              <a:rPr lang="he-IL" dirty="0"/>
+              <a:t> </a:t>
+            </a:r>
+            <a:r>
+              <a:rPr lang="he-IL" dirty="0" err="1"/>
+              <a:t>והתכנית</a:t>
+            </a:r>
+            <a:r>
+              <a:rPr lang="he-IL" dirty="0"/>
+              <a:t> (</a:t>
+            </a:r>
+            <a:r>
+              <a:rPr lang="en-US" dirty="0"/>
+              <a:t>STN</a:t>
+            </a:r>
+            <a:r>
+              <a:rPr lang="he-IL" dirty="0"/>
+              <a:t>) ותפקידו לשמש כמגדל בקרה ופיקוח.</a:t>
+            </a:r>
+          </a:p>
+          <a:p>
+            <a:pPr marL="171450" indent="-171450">
+              <a:buFontTx/>
+              <a:buChar char="-"/>
+            </a:pPr>
+            <a:r>
+              <a:rPr lang="he-IL" dirty="0"/>
+              <a:t>הסימולטור משמש כמודל לעולם אשר מריץ את הפעולות ונותן אינדיקציה כאשר פעולות הסתיימו.</a:t>
+            </a:r>
+          </a:p>
+          <a:p>
+            <a:pPr marL="171450" indent="-171450">
+              <a:buFontTx/>
+              <a:buChar char="-"/>
+            </a:pPr>
+            <a:r>
+              <a:rPr lang="he-IL" dirty="0"/>
+              <a:t>מודול מצב העולם (</a:t>
+            </a:r>
+            <a:r>
+              <a:rPr lang="en-US" dirty="0"/>
+              <a:t>state</a:t>
+            </a:r>
+            <a:r>
+              <a:rPr lang="he-IL" dirty="0"/>
+              <a:t>) מייצג תמונה של מצב כל המטוסים, נתיבים ושאר הפרמטרים אחריהם אנו עוקבים – מקבל </a:t>
+            </a:r>
+            <a:r>
+              <a:rPr lang="he-IL" dirty="0" err="1"/>
+              <a:t>עידכונים</a:t>
+            </a:r>
+            <a:r>
+              <a:rPr lang="he-IL" dirty="0"/>
+              <a:t> מהסימולטור על כל התחלה\סיום של פעולה.</a:t>
+            </a:r>
+          </a:p>
+          <a:p>
+            <a:pPr marL="171450" indent="-171450">
+              <a:buFontTx/>
+              <a:buChar char="-"/>
+            </a:pPr>
+            <a:endParaRPr lang="he-IL" dirty="0"/>
+          </a:p>
+          <a:p>
+            <a:pPr marL="171450" indent="-171450">
+              <a:buFontTx/>
+              <a:buChar char="-"/>
+            </a:pPr>
+            <a:r>
+              <a:rPr lang="he-IL" dirty="0"/>
+              <a:t>מודול ההפרעות – בוחר באופן רנדומלי כל מספר פעולות לייצר הפרעה אשר נשלחת לסימולטור עבור פעולה כלשהי.</a:t>
+            </a:r>
+          </a:p>
+          <a:p>
+            <a:pPr marL="171450" indent="-171450">
+              <a:buFontTx/>
+              <a:buChar char="-"/>
+            </a:pPr>
+            <a:r>
+              <a:rPr lang="he-IL" dirty="0"/>
+              <a:t>שעון – מודול גלובלי אשר סופר זמן באופן דיסקרטי.</a:t>
+            </a:r>
+          </a:p>
+          <a:p>
+            <a:pPr marL="171450" indent="-171450">
+              <a:buFontTx/>
+              <a:buChar char="-"/>
+            </a:pPr>
+            <a:r>
+              <a:rPr lang="he-IL" dirty="0"/>
+              <a:t>אירועים – מודול גלובלי אשר משמש כאמצעי תקשורת בין המודולים השונים </a:t>
+            </a:r>
+            <a:r>
+              <a:rPr lang="he-IL" dirty="0" err="1"/>
+              <a:t>בתכנית</a:t>
+            </a:r>
+            <a:r>
+              <a:rPr lang="he-IL" dirty="0"/>
+              <a:t> שלנו.</a:t>
+            </a:r>
+          </a:p>
+          <a:p>
+            <a:pPr marL="171450" indent="-171450">
+              <a:buFontTx/>
+              <a:buChar char="-"/>
+            </a:pPr>
             <a:endParaRPr lang="he-IL" dirty="0"/>
           </a:p>
         </p:txBody>
@@ -7498,7 +7546,7 @@
           <a:p>
             <a:fld id="{5D87C9B3-3F36-45D2-B699-10C699E739B9}" type="slidenum">
               <a:rPr lang="he-IL" smtClean="0"/>
-              <a:t>13</a:t>
+              <a:t>12</a:t>
             </a:fld>
             <a:endParaRPr lang="he-IL"/>
           </a:p>
@@ -7507,7 +7555,7 @@
     </p:spTree>
     <p:extLst>
       <p:ext uri="{BB962C8B-B14F-4D97-AF65-F5344CB8AC3E}">
-        <p14:creationId xmlns:p14="http://schemas.microsoft.com/office/powerpoint/2010/main" val="2906297507"/>
+        <p14:creationId xmlns:p14="http://schemas.microsoft.com/office/powerpoint/2010/main" val="850113018"/>
       </p:ext>
     </p:extLst>
   </p:cSld>
@@ -7561,7 +7609,76 @@
           <a:bodyPr/>
           <a:lstStyle/>
           <a:p>
-            <a:endParaRPr lang="he-IL" dirty="0"/>
+            <a:r>
+              <a:rPr lang="he-IL" dirty="0"/>
+              <a:t>מנהל התוכנית הוא בעצם החולייה המקשרת בין אלגוריתם האונליין לאלגוריתם </a:t>
+            </a:r>
+            <a:r>
+              <a:rPr lang="he-IL" dirty="0" err="1"/>
+              <a:t>האופליין</a:t>
+            </a:r>
+            <a:r>
+              <a:rPr lang="he-IL" dirty="0"/>
+              <a:t>.</a:t>
+            </a:r>
+          </a:p>
+          <a:p>
+            <a:r>
+              <a:rPr lang="he-IL" dirty="0"/>
+              <a:t>הוא מקבל את הפלט של אלגוריתם </a:t>
+            </a:r>
+            <a:r>
+              <a:rPr lang="he-IL" dirty="0" err="1"/>
+              <a:t>האופליין</a:t>
+            </a:r>
+            <a:r>
+              <a:rPr lang="he-IL" dirty="0"/>
+              <a:t> ומסדר אותו, בנוסף הוא בונה את המודולים של אלגוריתם האונליין:</a:t>
+            </a:r>
+          </a:p>
+          <a:p>
+            <a:pPr marL="171450" indent="-171450">
+              <a:buFont typeface="Arial" panose="020B0604020202020204" pitchFamily="34" charset="0"/>
+              <a:buChar char="•"/>
+            </a:pPr>
+            <a:r>
+              <a:rPr lang="he-IL" dirty="0"/>
+              <a:t>הוא אחראי על יצירת המודולים הגלובליים, ועל הניקיון שלהם כאשר מתקבלת תוכנית חדשה.</a:t>
+            </a:r>
+          </a:p>
+          <a:p>
+            <a:pPr marL="171450" indent="-171450">
+              <a:buFont typeface="Arial" panose="020B0604020202020204" pitchFamily="34" charset="0"/>
+              <a:buChar char="•"/>
+            </a:pPr>
+            <a:r>
+              <a:rPr lang="he-IL" dirty="0"/>
+              <a:t>הוא יוצא את המודולים הלוקאלים עבור כל טסט ומקשר בניהם.</a:t>
+            </a:r>
+          </a:p>
+          <a:p>
+            <a:pPr marL="171450" indent="-171450">
+              <a:buFont typeface="Arial" panose="020B0604020202020204" pitchFamily="34" charset="0"/>
+              <a:buChar char="•"/>
+            </a:pPr>
+            <a:r>
+              <a:rPr lang="he-IL" dirty="0"/>
+              <a:t>בודק האם יש צורך בתכנון מחדש ומריץ את אלגוריתם </a:t>
+            </a:r>
+            <a:r>
+              <a:rPr lang="he-IL" dirty="0" err="1"/>
+              <a:t>האופליין</a:t>
+            </a:r>
+            <a:r>
+              <a:rPr lang="he-IL" dirty="0"/>
+              <a:t>.</a:t>
+            </a:r>
+          </a:p>
+          <a:p>
+            <a:r>
+              <a:rPr lang="he-IL" dirty="0"/>
+              <a:t>		</a:t>
+            </a:r>
           </a:p>
         </p:txBody>
       </p:sp>
@@ -7605,7 +7722,7 @@
           <a:p>
             <a:fld id="{5D87C9B3-3F36-45D2-B699-10C699E739B9}" type="slidenum">
               <a:rPr lang="he-IL" smtClean="0"/>
-              <a:t>14</a:t>
+              <a:t>13</a:t>
             </a:fld>
             <a:endParaRPr lang="he-IL"/>
           </a:p>
@@ -7614,7 +7731,7 @@
     </p:spTree>
     <p:extLst>
       <p:ext uri="{BB962C8B-B14F-4D97-AF65-F5344CB8AC3E}">
-        <p14:creationId xmlns:p14="http://schemas.microsoft.com/office/powerpoint/2010/main" val="34609377"/>
+        <p14:creationId xmlns:p14="http://schemas.microsoft.com/office/powerpoint/2010/main" val="2906297507"/>
       </p:ext>
     </p:extLst>
   </p:cSld>
@@ -7670,68 +7787,21 @@
           <a:p>
             <a:r>
               <a:rPr lang="he-IL" dirty="0"/>
-              <a:t>הבקר מייצר את מבניי הנתונים שלו על סמך התכנית מהמודול אופליין.</a:t>
-            </a:r>
-          </a:p>
-          <a:p>
+              <a:t>כאן ניתן לראות את ה-</a:t>
+            </a:r>
+            <a:r>
+              <a:rPr lang="en-US" dirty="0"/>
+              <a:t>flow</a:t>
+            </a:r>
             <a:r>
               <a:rPr lang="he-IL" dirty="0"/>
-              <a:t>הבקר הוא מגדל הפיקוח אשר שולח את הפעולות שמוכנות לביצוע לסימולטור.</a:t>
+              <a:t> של מנהל התוכנית:</a:t>
             </a:r>
           </a:p>
           <a:p>
             <a:r>
               <a:rPr lang="he-IL" dirty="0"/>
-              <a:t>עבור כל פעולה נבדוק האם האבות של אותה פעולה הסתיימו והגיע הזמן שלה לרוץ.</a:t>
-            </a:r>
-          </a:p>
-          <a:p>
-            <a:r>
-              <a:rPr lang="he-IL" dirty="0"/>
-              <a:t>טרם שליחת הפעולה לסימולטור מוודאים את חוקיות הפעולה אל מול מודול מצב העולם.</a:t>
-            </a:r>
-          </a:p>
-          <a:p>
-            <a:pPr marL="0" marR="0" lvl="0" indent="0" algn="r" defTabSz="914400" rtl="1" eaLnBrk="1" fontAlgn="auto" latinLnBrk="0" hangingPunct="1">
-              <a:lnSpc>
-                <a:spcPct val="100000"/>
-              </a:lnSpc>
-              <a:spcBef>
-                <a:spcPts val="0"/>
-              </a:spcBef>
-              <a:spcAft>
-                <a:spcPts val="0"/>
-              </a:spcAft>
-              <a:buClrTx/>
-              <a:buSzTx/>
-              <a:buFontTx/>
-              <a:buNone/>
-              <a:tabLst/>
-              <a:defRPr/>
-            </a:pPr>
-            <a:r>
-              <a:rPr lang="he-IL" dirty="0"/>
-              <a:t>עבור כל פעולה שנשלחת לסימולטור מבצע המרה של משך הפעולה לפי ציר הזמן שהוגדר.</a:t>
-            </a:r>
-          </a:p>
-          <a:p>
-            <a:r>
-              <a:rPr lang="he-IL" dirty="0"/>
-              <a:t>עבור כל פעולה שהסתיימה מעדכן בגרף בצומת המתאים את הדגל של הפעולה.</a:t>
-            </a:r>
-          </a:p>
-          <a:p>
-            <a:r>
-              <a:rPr lang="he-IL" dirty="0"/>
-              <a:t>כאשר הבקר סיים את כל הפעולות שקיימות </a:t>
-            </a:r>
-            <a:r>
-              <a:rPr lang="he-IL" dirty="0" err="1"/>
-              <a:t>בתכנית</a:t>
-            </a:r>
-            <a:r>
-              <a:rPr lang="he-IL" dirty="0"/>
-              <a:t> –מעלה אירוע שהוא סיים.</a:t>
+              <a:t>פשוט לעבור על הדיאגרמה ולהקריא. להדגיש מה גלובלי ומה נבנה עבור כל טסט מחדש.</a:t>
             </a:r>
           </a:p>
         </p:txBody>
@@ -7776,7 +7846,7 @@
           <a:p>
             <a:fld id="{5D87C9B3-3F36-45D2-B699-10C699E739B9}" type="slidenum">
               <a:rPr lang="he-IL" smtClean="0"/>
-              <a:t>15</a:t>
+              <a:t>14</a:t>
             </a:fld>
             <a:endParaRPr lang="he-IL"/>
           </a:p>
@@ -7785,7 +7855,7 @@
     </p:spTree>
     <p:extLst>
       <p:ext uri="{BB962C8B-B14F-4D97-AF65-F5344CB8AC3E}">
-        <p14:creationId xmlns:p14="http://schemas.microsoft.com/office/powerpoint/2010/main" val="4166017777"/>
+        <p14:creationId xmlns:p14="http://schemas.microsoft.com/office/powerpoint/2010/main" val="34609377"/>
       </p:ext>
     </p:extLst>
   </p:cSld>
@@ -7839,7 +7909,85 @@
           <a:bodyPr/>
           <a:lstStyle/>
           <a:p>
+            <a:r>
+              <a:rPr lang="he-IL" dirty="0" err="1"/>
+              <a:t>הקונטרולר</a:t>
+            </a:r>
+            <a:r>
+              <a:rPr lang="he-IL" dirty="0"/>
+              <a:t> הוא כביכול מגדל הפיקוח של התוכנית. הוא שולח את הפעולות שמוכנות לביצוע לסימולטור.</a:t>
+            </a:r>
+          </a:p>
+          <a:p>
+            <a:r>
+              <a:rPr lang="he-IL" dirty="0" err="1"/>
+              <a:t>הקונטרולר</a:t>
+            </a:r>
+            <a:r>
+              <a:rPr lang="he-IL" dirty="0"/>
+              <a:t> מחזיק בגרף התלויות כפי שקיבלנו מאלגוריתם </a:t>
+            </a:r>
+            <a:r>
+              <a:rPr lang="he-IL" dirty="0" err="1"/>
+              <a:t>האופליין</a:t>
+            </a:r>
+            <a:r>
+              <a:rPr lang="he-IL" dirty="0"/>
+              <a:t> ומחזיק גם את תור העדיפויות שלפיו נשלחות הפעולות לביצוע.</a:t>
+            </a:r>
+          </a:p>
+          <a:p>
+            <a:r>
+              <a:rPr lang="he-IL" dirty="0"/>
+              <a:t>הוא מחזיק </a:t>
+            </a:r>
+            <a:r>
+              <a:rPr lang="he-IL" dirty="0" err="1"/>
+              <a:t>רפרנס</a:t>
+            </a:r>
+            <a:r>
+              <a:rPr lang="he-IL" dirty="0"/>
+              <a:t> למודולים של ה-</a:t>
+            </a:r>
+            <a:r>
+              <a:rPr lang="en-US" dirty="0"/>
+              <a:t>clock</a:t>
+            </a:r>
+            <a:r>
+              <a:rPr lang="he-IL" dirty="0"/>
+              <a:t> וה-</a:t>
+            </a:r>
+            <a:r>
+              <a:rPr lang="en-US" dirty="0"/>
+              <a:t>events</a:t>
+            </a:r>
+            <a:r>
+              <a:rPr lang="he-IL" dirty="0"/>
+              <a:t>. מודול ההפרעות מאזין </a:t>
+            </a:r>
+            <a:r>
+              <a:rPr lang="he-IL" dirty="0" err="1"/>
+              <a:t>לקונטרולר</a:t>
+            </a:r>
+            <a:r>
+              <a:rPr lang="he-IL" dirty="0"/>
+              <a:t>.</a:t>
+            </a:r>
+          </a:p>
+          <a:p>
             <a:endParaRPr lang="he-IL" dirty="0"/>
+          </a:p>
+          <a:p>
+            <a:r>
+              <a:rPr lang="he-IL" dirty="0"/>
+              <a:t>הבקר מייצר את מבניי הנתונים שלו על סמך התכנית מהמודול אופליין.</a:t>
+            </a:r>
+          </a:p>
+          <a:p>
+            <a:r>
+              <a:rPr lang="he-IL" dirty="0"/>
+              <a:t>הבקר הוא מגדל הפיקוח אשר שולח את הפעולות שמוכנות לביצוע לסימולטור.</a:t>
+            </a:r>
           </a:p>
         </p:txBody>
       </p:sp>
@@ -7883,7 +8031,7 @@
           <a:p>
             <a:fld id="{5D87C9B3-3F36-45D2-B699-10C699E739B9}" type="slidenum">
               <a:rPr lang="he-IL" smtClean="0"/>
-              <a:t>16</a:t>
+              <a:t>15</a:t>
             </a:fld>
             <a:endParaRPr lang="he-IL"/>
           </a:p>
@@ -7892,7 +8040,7 @@
     </p:spTree>
     <p:extLst>
       <p:ext uri="{BB962C8B-B14F-4D97-AF65-F5344CB8AC3E}">
-        <p14:creationId xmlns:p14="http://schemas.microsoft.com/office/powerpoint/2010/main" val="777958349"/>
+        <p14:creationId xmlns:p14="http://schemas.microsoft.com/office/powerpoint/2010/main" val="4166017777"/>
       </p:ext>
     </p:extLst>
   </p:cSld>
@@ -7948,41 +8096,27 @@
           <a:p>
             <a:r>
               <a:rPr lang="he-IL" dirty="0"/>
-              <a:t>הרשימה שלפיה נקבע מי הפעולה הבאה לביצוע לפי סדר כרונולוגי של תחיל ביצוע.</a:t>
-            </a:r>
-          </a:p>
-          <a:p>
+              <a:t>הגרף הוא בעצם הפלט של תוכנית </a:t>
+            </a:r>
+            <a:r>
+              <a:rPr lang="he-IL" dirty="0" err="1"/>
+              <a:t>האופליין</a:t>
+            </a:r>
             <a:r>
               <a:rPr lang="he-IL" dirty="0"/>
-              <a:t>רשימה זו מחזיקה מצביעים לצמתי בגרף.</a:t>
+              <a:t>.</a:t>
             </a:r>
           </a:p>
           <a:p>
             <a:r>
               <a:rPr lang="he-IL" dirty="0"/>
-              <a:t>הרשימה היא תור עדיפויות על פי הזמן שבו הפעולה אמורה להתחיל. (ממוש על ידי </a:t>
-            </a:r>
-            <a:r>
-              <a:rPr lang="he-IL" dirty="0" err="1"/>
-              <a:t>ערימת</a:t>
-            </a:r>
+              <a:t>סידרנו אותו במבנה נתונים כזה, על מנת שיהיה לנו נוח לבצע חיפוש בגרף ולעקוב אחר התלויות (איזו פעולה תלויה באיזו פעולה – מיוצג ע"י קשרי אב ובן).</a:t>
+            </a:r>
+          </a:p>
+          <a:p>
             <a:r>
               <a:rPr lang="he-IL" dirty="0"/>
-              <a:t> מינימום).</a:t>
-            </a:r>
-          </a:p>
-          <a:p>
-            <a:r>
-              <a:rPr lang="he-IL" dirty="0"/>
-              <a:t>פעולות שהזמן שלהן הגיע אך טרם מוכנות (עקב הפרעה או שינוי סדר פעולות על ידי הבקר) מקבלות קנס של יחידת זמן אחת ובכך אנו משנים את סדר הפעולות </a:t>
-            </a:r>
-            <a:r>
-              <a:rPr lang="he-IL" dirty="0" err="1"/>
-              <a:t>מהתכנית</a:t>
-            </a:r>
-            <a:r>
-              <a:rPr lang="he-IL" dirty="0"/>
-              <a:t> המקורית.</a:t>
+              <a:t>לעבור על המלל והגרף, שיראו את המעבר. תוך דגש על מקומות עם מס' תלויות.</a:t>
             </a:r>
           </a:p>
         </p:txBody>
@@ -8027,7 +8161,7 @@
           <a:p>
             <a:fld id="{5D87C9B3-3F36-45D2-B699-10C699E739B9}" type="slidenum">
               <a:rPr lang="he-IL" smtClean="0"/>
-              <a:t>17</a:t>
+              <a:t>16</a:t>
             </a:fld>
             <a:endParaRPr lang="he-IL"/>
           </a:p>
@@ -8036,7 +8170,7 @@
     </p:spTree>
     <p:extLst>
       <p:ext uri="{BB962C8B-B14F-4D97-AF65-F5344CB8AC3E}">
-        <p14:creationId xmlns:p14="http://schemas.microsoft.com/office/powerpoint/2010/main" val="243888583"/>
+        <p14:creationId xmlns:p14="http://schemas.microsoft.com/office/powerpoint/2010/main" val="777958349"/>
       </p:ext>
     </p:extLst>
   </p:cSld>
@@ -8090,6 +8224,205 @@
           <a:bodyPr/>
           <a:lstStyle/>
           <a:p>
+            <a:r>
+              <a:rPr lang="he-IL" dirty="0"/>
+              <a:t>זה הוא תור העדיפויות שלפיו הבקר שולח את הפעולות לביצוע. בתחילת התוכנית התור מסודר לפי התוכנית הראשונית שהתקבלה ממנהל התוכנית.</a:t>
+            </a:r>
+          </a:p>
+          <a:p>
+            <a:r>
+              <a:rPr lang="he-IL" dirty="0"/>
+              <a:t>- התור מסודר לפי הזמן בו הפעולה אמורה להתחיל ביחס לתחילת הבעיה (להצביע על הדיאגרמה ולהסביר).</a:t>
+            </a:r>
+          </a:p>
+          <a:p>
+            <a:pPr marL="171450" indent="-171450">
+              <a:buFontTx/>
+              <a:buChar char="-"/>
+            </a:pPr>
+            <a:r>
+              <a:rPr lang="he-IL" dirty="0"/>
+              <a:t>התור מורכב ממצביעים לצמתים בגרף (אשר מכילים מידע על כל פעולה).</a:t>
+            </a:r>
+          </a:p>
+          <a:p>
+            <a:pPr marL="171450" indent="-171450">
+              <a:buFontTx/>
+              <a:buChar char="-"/>
+            </a:pPr>
+            <a:r>
+              <a:rPr lang="he-IL" dirty="0"/>
+              <a:t>עבור כל פעולה נבדוק מס' דברים:</a:t>
+            </a:r>
+          </a:p>
+          <a:p>
+            <a:pPr marL="171450" indent="-171450">
+              <a:buFontTx/>
+              <a:buChar char="-"/>
+            </a:pPr>
+            <a:r>
+              <a:rPr lang="he-IL" dirty="0"/>
+              <a:t>1. האם האבות שלה סיימו.</a:t>
+            </a:r>
+          </a:p>
+          <a:p>
+            <a:pPr marL="171450" indent="-171450">
+              <a:buFontTx/>
+              <a:buChar char="-"/>
+            </a:pPr>
+            <a:r>
+              <a:rPr lang="he-IL" dirty="0"/>
+              <a:t>2. האם הגיע הזמן שלה לרוץ.</a:t>
+            </a:r>
+          </a:p>
+          <a:p>
+            <a:pPr marL="171450" indent="-171450">
+              <a:buFontTx/>
+              <a:buChar char="-"/>
+            </a:pPr>
+            <a:r>
+              <a:rPr lang="he-IL" dirty="0"/>
+              <a:t>3. מוודאים את חוקיות הפעולה מול מודול מצב העולם (לדג' נחיתה צריכה נתיב, אז האם יש נתיב פנוי)</a:t>
+            </a:r>
+          </a:p>
+          <a:p>
+            <a:pPr marL="171450" indent="-171450">
+              <a:buFontTx/>
+              <a:buChar char="-"/>
+            </a:pPr>
+            <a:endParaRPr lang="he-IL" dirty="0"/>
+          </a:p>
+          <a:p>
+            <a:pPr marL="171450" indent="-171450">
+              <a:buFontTx/>
+              <a:buChar char="-"/>
+            </a:pPr>
+            <a:r>
+              <a:rPr lang="he-IL" dirty="0"/>
+              <a:t>(עבור כל פעולה שנשלחת לסימולטור מתבצעת המרת יחידות של משך הפעולה לפי ציר הזמן שהוגדר)</a:t>
+            </a:r>
+          </a:p>
+          <a:p>
+            <a:pPr marL="171450" indent="-171450">
+              <a:buFontTx/>
+              <a:buChar char="-"/>
+            </a:pPr>
+            <a:endParaRPr lang="he-IL" dirty="0"/>
+          </a:p>
+          <a:p>
+            <a:pPr marL="171450" indent="-171450">
+              <a:buFontTx/>
+              <a:buChar char="-"/>
+            </a:pPr>
+            <a:r>
+              <a:rPr lang="he-IL" dirty="0"/>
+              <a:t>פעולות שהזמן שלהן הגיע אך לא מוכנות (עקב הפרעה או שינוי סדר פעולות על ידי הבקר) מקבלות קנס של יחידת זמן אחת ובכך אנו משנים את סדר הפעולות מהתוכנית המקורית.</a:t>
+            </a:r>
+          </a:p>
+          <a:p>
+            <a:pPr marL="171450" indent="-171450">
+              <a:buFontTx/>
+              <a:buChar char="-"/>
+            </a:pPr>
+            <a:endParaRPr lang="he-IL" dirty="0"/>
+          </a:p>
+          <a:p>
+            <a:pPr marL="171450" indent="-171450">
+              <a:buFontTx/>
+              <a:buChar char="-"/>
+            </a:pPr>
+            <a:r>
+              <a:rPr lang="he-IL" dirty="0"/>
+              <a:t>כל פעולה שהסתיימה מרימה דגל בצומת שלה בגרף.</a:t>
+            </a:r>
+          </a:p>
+          <a:p>
+            <a:pPr marL="171450" indent="-171450">
+              <a:buFontTx/>
+              <a:buChar char="-"/>
+            </a:pPr>
+            <a:r>
+              <a:rPr lang="he-IL" dirty="0"/>
+              <a:t>כאשר כל הפעולות הסתיימו והתור ריק – </a:t>
+            </a:r>
+            <a:r>
+              <a:rPr lang="he-IL" dirty="0" err="1"/>
+              <a:t>הקונטרולר</a:t>
+            </a:r>
+            <a:r>
+              <a:rPr lang="he-IL" dirty="0"/>
+              <a:t> מעלה </a:t>
+            </a:r>
+            <a:r>
+              <a:rPr lang="he-IL" dirty="0" err="1"/>
+              <a:t>איבנט</a:t>
+            </a:r>
+            <a:r>
+              <a:rPr lang="he-IL" dirty="0"/>
+              <a:t> שהוא סיים.</a:t>
+            </a:r>
+          </a:p>
+          <a:p>
+            <a:pPr marL="171450" indent="-171450">
+              <a:buFontTx/>
+              <a:buChar char="-"/>
+            </a:pPr>
+            <a:endParaRPr lang="he-IL" dirty="0"/>
+          </a:p>
+          <a:p>
+            <a:pPr marL="171450" indent="-171450">
+              <a:buFontTx/>
+              <a:buChar char="-"/>
+            </a:pPr>
+            <a:endParaRPr lang="he-IL" dirty="0"/>
+          </a:p>
+          <a:p>
+            <a:endParaRPr lang="he-IL" dirty="0"/>
+          </a:p>
+          <a:p>
+            <a:pPr marL="0" marR="0" lvl="0" indent="0" algn="r" defTabSz="914400" rtl="1" eaLnBrk="1" fontAlgn="auto" latinLnBrk="0" hangingPunct="1">
+              <a:lnSpc>
+                <a:spcPct val="100000"/>
+              </a:lnSpc>
+              <a:spcBef>
+                <a:spcPts val="0"/>
+              </a:spcBef>
+              <a:spcAft>
+                <a:spcPts val="0"/>
+              </a:spcAft>
+              <a:buClrTx/>
+              <a:buSzTx/>
+              <a:buFontTx/>
+              <a:buNone/>
+              <a:tabLst/>
+              <a:defRPr/>
+            </a:pPr>
+            <a:r>
+              <a:rPr lang="he-IL" dirty="0"/>
+              <a:t>עבור כל פעולה שנשלחת לסימולטור מבצע המרה של משך הפעולה לפי ציר הזמן שהוגדר.</a:t>
+            </a:r>
+          </a:p>
+          <a:p>
+            <a:r>
+              <a:rPr lang="he-IL" dirty="0"/>
+              <a:t>עבור כל פעולה שהסתיימה מעדכן בגרף בצומת המתאים את הדגל של הפעולה.</a:t>
+            </a:r>
+          </a:p>
+          <a:p>
+            <a:r>
+              <a:rPr lang="he-IL" dirty="0"/>
+              <a:t>כאשר הבקר סיים את כל הפעולות שקיימות </a:t>
+            </a:r>
+            <a:r>
+              <a:rPr lang="he-IL" dirty="0" err="1"/>
+              <a:t>בתכנית</a:t>
+            </a:r>
+            <a:r>
+              <a:rPr lang="he-IL" dirty="0"/>
+              <a:t> –מעלה אירוע שהוא סיים.</a:t>
+            </a:r>
+          </a:p>
+          <a:p>
             <a:endParaRPr lang="he-IL" dirty="0"/>
           </a:p>
         </p:txBody>
@@ -8134,7 +8467,7 @@
           <a:p>
             <a:fld id="{5D87C9B3-3F36-45D2-B699-10C699E739B9}" type="slidenum">
               <a:rPr lang="he-IL" smtClean="0"/>
-              <a:t>18</a:t>
+              <a:t>17</a:t>
             </a:fld>
             <a:endParaRPr lang="he-IL"/>
           </a:p>
@@ -8143,7 +8476,7 @@
     </p:spTree>
     <p:extLst>
       <p:ext uri="{BB962C8B-B14F-4D97-AF65-F5344CB8AC3E}">
-        <p14:creationId xmlns:p14="http://schemas.microsoft.com/office/powerpoint/2010/main" val="3276345102"/>
+        <p14:creationId xmlns:p14="http://schemas.microsoft.com/office/powerpoint/2010/main" val="243888583"/>
       </p:ext>
     </p:extLst>
   </p:cSld>
@@ -8197,44 +8530,6 @@
           <a:bodyPr/>
           <a:lstStyle/>
           <a:p>
-            <a:r>
-              <a:rPr lang="he-IL" dirty="0"/>
-              <a:t>הסימולטור מדמה את מצב העולם, אין לא יכולת החלטה על ביצוע של דברים אלא הוא מקבל פקודות בלבד ועושה אותן.</a:t>
-            </a:r>
-          </a:p>
-          <a:p>
-            <a:r>
-              <a:rPr lang="he-IL" dirty="0"/>
-              <a:t>במידה ומודול ההפרעות החליט על הפרעה הסימולטור מוסיף את משך ההפרעה לפעולה המתאימה.</a:t>
-            </a:r>
-          </a:p>
-          <a:p>
-            <a:r>
-              <a:rPr lang="he-IL" dirty="0"/>
-              <a:t>הסימולטור בכל התחלה וסיום של פעולה חדשה מבצע </a:t>
-            </a:r>
-            <a:r>
-              <a:rPr lang="he-IL" dirty="0" err="1"/>
-              <a:t>עידכון</a:t>
-            </a:r>
-            <a:r>
-              <a:rPr lang="he-IL" dirty="0"/>
-              <a:t> של מודול מצב העולם.</a:t>
-            </a:r>
-          </a:p>
-          <a:p>
-            <a:r>
-              <a:rPr lang="he-IL" dirty="0"/>
-              <a:t>הסימולטור בכל מחזור שעון מוריד יחידת זמן מנורמלת מכלל הפעולות שכרגע בביצוע.</a:t>
-            </a:r>
-          </a:p>
-          <a:p>
-            <a:r>
-              <a:rPr lang="he-IL" dirty="0"/>
-              <a:t>הסימולטור הוא "מקבילי" כלומר ייתכן שבאותו מחזור שעון יתחילו\ יסתיימו מספר פעולות במקביל.</a:t>
-            </a:r>
-          </a:p>
-          <a:p>
             <a:endParaRPr lang="he-IL" dirty="0"/>
           </a:p>
         </p:txBody>
@@ -8279,7 +8574,7 @@
           <a:p>
             <a:fld id="{5D87C9B3-3F36-45D2-B699-10C699E739B9}" type="slidenum">
               <a:rPr lang="he-IL" smtClean="0"/>
-              <a:t>19</a:t>
+              <a:t>18</a:t>
             </a:fld>
             <a:endParaRPr lang="he-IL"/>
           </a:p>
@@ -8288,7 +8583,7 @@
     </p:spTree>
     <p:extLst>
       <p:ext uri="{BB962C8B-B14F-4D97-AF65-F5344CB8AC3E}">
-        <p14:creationId xmlns:p14="http://schemas.microsoft.com/office/powerpoint/2010/main" val="551762232"/>
+        <p14:creationId xmlns:p14="http://schemas.microsoft.com/office/powerpoint/2010/main" val="3276345102"/>
       </p:ext>
     </p:extLst>
   </p:cSld>
@@ -8344,14 +8639,96 @@
           <a:p>
             <a:r>
               <a:rPr lang="he-IL" dirty="0"/>
-              <a:t>הסדר בדומה לבקר אך הפרמטר מיון הוא משך הפעולה, ייתכן שמשך הפעולה כולל הפרעה שהתקבלה.</a:t>
+              <a:t>הסימולטור מדמה את מצב העולם, אין לא יכולת החלטה על ביצוע של דברים אלא הוא מקבל פקודות בלבד ועושה אותן.</a:t>
             </a:r>
           </a:p>
           <a:p>
             <a:r>
               <a:rPr lang="he-IL" dirty="0"/>
-              <a:t>כל מחזור שעון מורידים יחידת זמן מנורמלת מכלל הפעולות שכרגע בביצוע.</a:t>
-            </a:r>
+              <a:t>הסימולטור מחזיק תור עדיפויות שונה </a:t>
+            </a:r>
+            <a:r>
+              <a:rPr lang="he-IL" dirty="0" err="1"/>
+              <a:t>מקונטרולר</a:t>
+            </a:r>
+            <a:r>
+              <a:rPr lang="he-IL" dirty="0"/>
+              <a:t> (נסביר בהמשך) שלפיו הסימולטור יודע אילו פעולות סיימו.</a:t>
+            </a:r>
+          </a:p>
+          <a:p>
+            <a:r>
+              <a:rPr lang="he-IL" dirty="0"/>
+              <a:t>הוא מחזיק </a:t>
+            </a:r>
+            <a:r>
+              <a:rPr lang="he-IL" dirty="0" err="1"/>
+              <a:t>רפרנס</a:t>
+            </a:r>
+            <a:r>
+              <a:rPr lang="he-IL" dirty="0"/>
+              <a:t> למודולים של ה-</a:t>
+            </a:r>
+            <a:r>
+              <a:rPr lang="en-US" dirty="0"/>
+              <a:t>clock</a:t>
+            </a:r>
+            <a:r>
+              <a:rPr lang="he-IL" dirty="0"/>
+              <a:t> וה-</a:t>
+            </a:r>
+            <a:r>
+              <a:rPr lang="en-US" dirty="0"/>
+              <a:t>events</a:t>
+            </a:r>
+            <a:r>
+              <a:rPr lang="he-IL" dirty="0"/>
+              <a:t>. מודול מצב העולם מאזין לסימולטור.</a:t>
+            </a:r>
+          </a:p>
+          <a:p>
+            <a:endParaRPr lang="he-IL" dirty="0"/>
+          </a:p>
+          <a:p>
+            <a:r>
+              <a:rPr lang="he-IL" dirty="0"/>
+              <a:t>הסימולטור מדמה את מצב העולם, אין לא יכולת החלטה על ביצוע של דברים אלא הוא מקבל פקודות בלבד ועושה אותן.</a:t>
+            </a:r>
+          </a:p>
+          <a:p>
+            <a:r>
+              <a:rPr lang="he-IL" dirty="0"/>
+              <a:t>במידה ומודול ההפרעות החליט על הפרעה הסימולטור מוסיף את משך ההפרעה לפעולה המתאימה.</a:t>
+            </a:r>
+          </a:p>
+          <a:p>
+            <a:r>
+              <a:rPr lang="he-IL" dirty="0"/>
+              <a:t>הסימולטור בכל התחלה וסיום של פעולה חדשה מבצע </a:t>
+            </a:r>
+            <a:r>
+              <a:rPr lang="he-IL" dirty="0" err="1"/>
+              <a:t>עידכון</a:t>
+            </a:r>
+            <a:r>
+              <a:rPr lang="he-IL" dirty="0"/>
+              <a:t> של מודול מצב העולם.</a:t>
+            </a:r>
+          </a:p>
+          <a:p>
+            <a:r>
+              <a:rPr lang="he-IL" dirty="0"/>
+              <a:t>הסימולטור בכל מחזור שעון מוריד יחידת זמן מנורמלת מכלל הפעולות שכרגע בביצוע.</a:t>
+            </a:r>
+          </a:p>
+          <a:p>
+            <a:r>
+              <a:rPr lang="he-IL" dirty="0"/>
+              <a:t>הסימולטור הוא "מקבילי" כלומר ייתכן שבאותו מחזור שעון יתחילו\ יסתיימו מספר פעולות במקביל.</a:t>
+            </a:r>
+          </a:p>
+          <a:p>
+            <a:endParaRPr lang="he-IL" dirty="0"/>
           </a:p>
         </p:txBody>
       </p:sp>
@@ -8395,7 +8772,7 @@
           <a:p>
             <a:fld id="{5D87C9B3-3F36-45D2-B699-10C699E739B9}" type="slidenum">
               <a:rPr lang="he-IL" smtClean="0"/>
-              <a:t>20</a:t>
+              <a:t>19</a:t>
             </a:fld>
             <a:endParaRPr lang="he-IL"/>
           </a:p>
@@ -8404,7 +8781,7 @@
     </p:spTree>
     <p:extLst>
       <p:ext uri="{BB962C8B-B14F-4D97-AF65-F5344CB8AC3E}">
-        <p14:creationId xmlns:p14="http://schemas.microsoft.com/office/powerpoint/2010/main" val="2543853672"/>
+        <p14:creationId xmlns:p14="http://schemas.microsoft.com/office/powerpoint/2010/main" val="551762232"/>
       </p:ext>
     </p:extLst>
   </p:cSld>
@@ -8625,7 +9002,37 @@
           <a:p>
             <a:r>
               <a:rPr lang="he-IL" dirty="0"/>
-              <a:t>בעיות בייצוג של 0 במחשב לכן הגדרנו "0" עבור הבעיה שלנו</a:t>
+              <a:t>זה הוא תור העדיפויות שלפיו הסימולטור יודע אילו פעולות מתבצעות כעת ואילו פעולות סיימו.</a:t>
+            </a:r>
+          </a:p>
+          <a:p>
+            <a:r>
+              <a:rPr lang="he-IL" dirty="0"/>
+              <a:t>הפעולות ממוינות לפי משך הפעולה (להצביע על הדיאגרמה ולהסביר).</a:t>
+            </a:r>
+          </a:p>
+          <a:p>
+            <a:r>
+              <a:rPr lang="he-IL" dirty="0"/>
+              <a:t>- במידה ומודול ההפרעות החליט על הפרעה, הסימולטור מוסיף את משך ההפרעה לפעולה המתאימה.</a:t>
+            </a:r>
+          </a:p>
+          <a:p>
+            <a:r>
+              <a:rPr lang="he-IL" dirty="0"/>
+              <a:t>- הסימולטור בכל התחלה וסיום של פעולה חדשה מבצע עדכון של מודול מצב העולם.</a:t>
+            </a:r>
+          </a:p>
+          <a:p>
+            <a:r>
+              <a:rPr lang="he-IL" dirty="0"/>
+              <a:t>- הסימולטור בכל מחזור שעון מוריד יחידת זמן מנורמלת מכלל הפעולות שכרגע בביצוע.</a:t>
+            </a:r>
+          </a:p>
+          <a:p>
+            <a:r>
+              <a:rPr lang="he-IL" dirty="0"/>
+              <a:t>- הסימולטור הוא "מקבילי" כלומר ייתכן שבאותו מחזור שעון יתחילו\ יסתיימו מספר פעולות במקביל.</a:t>
             </a:r>
           </a:p>
         </p:txBody>
@@ -8670,7 +9077,7 @@
           <a:p>
             <a:fld id="{5D87C9B3-3F36-45D2-B699-10C699E739B9}" type="slidenum">
               <a:rPr lang="he-IL" smtClean="0"/>
-              <a:t>21</a:t>
+              <a:t>20</a:t>
             </a:fld>
             <a:endParaRPr lang="he-IL"/>
           </a:p>
@@ -8679,7 +9086,7 @@
     </p:spTree>
     <p:extLst>
       <p:ext uri="{BB962C8B-B14F-4D97-AF65-F5344CB8AC3E}">
-        <p14:creationId xmlns:p14="http://schemas.microsoft.com/office/powerpoint/2010/main" val="1534296304"/>
+        <p14:creationId xmlns:p14="http://schemas.microsoft.com/office/powerpoint/2010/main" val="2543853672"/>
       </p:ext>
     </p:extLst>
   </p:cSld>
@@ -8735,35 +9142,7 @@
           <a:p>
             <a:r>
               <a:rPr lang="he-IL" dirty="0"/>
-              <a:t>מודול אשר מרכז את התקשורת עבור כלל התכנית.</a:t>
-            </a:r>
-          </a:p>
-          <a:p>
-            <a:r>
-              <a:rPr lang="he-IL" dirty="0"/>
-              <a:t>שאר המודולים מדברים דרכו דרך מערכת סיגנלים.</a:t>
-            </a:r>
-          </a:p>
-          <a:p>
-            <a:r>
-              <a:rPr lang="he-IL" dirty="0"/>
-              <a:t>בתחילת המימוש התקשורת התבצעה ישירות בין </a:t>
-            </a:r>
-            <a:r>
-              <a:rPr lang="he-IL" dirty="0" err="1"/>
-              <a:t>המודלוים</a:t>
-            </a:r>
-            <a:r>
-              <a:rPr lang="he-IL" dirty="0"/>
-              <a:t> מה שגרר צימוד גבוה של התכנית שלנו ולכן יצרנו מודול זה על מנת לבטל את התלויות החזקות שנוצרו </a:t>
-            </a:r>
-            <a:r>
-              <a:rPr lang="he-IL" dirty="0" err="1"/>
-              <a:t>בתכנית</a:t>
-            </a:r>
-            <a:r>
-              <a:rPr lang="he-IL" dirty="0"/>
-              <a:t>.</a:t>
+              <a:t>בעיות בייצוג של 0 במחשב לכן הגדרנו "0" עבור הבעיה שלנו</a:t>
             </a:r>
           </a:p>
         </p:txBody>
@@ -8808,7 +9187,7 @@
           <a:p>
             <a:fld id="{5D87C9B3-3F36-45D2-B699-10C699E739B9}" type="slidenum">
               <a:rPr lang="he-IL" smtClean="0"/>
-              <a:t>22</a:t>
+              <a:t>21</a:t>
             </a:fld>
             <a:endParaRPr lang="he-IL"/>
           </a:p>
@@ -8817,7 +9196,7 @@
     </p:spTree>
     <p:extLst>
       <p:ext uri="{BB962C8B-B14F-4D97-AF65-F5344CB8AC3E}">
-        <p14:creationId xmlns:p14="http://schemas.microsoft.com/office/powerpoint/2010/main" val="3654397469"/>
+        <p14:creationId xmlns:p14="http://schemas.microsoft.com/office/powerpoint/2010/main" val="1534296304"/>
       </p:ext>
     </p:extLst>
   </p:cSld>
@@ -8873,19 +9252,24 @@
           <a:p>
             <a:r>
               <a:rPr lang="he-IL" dirty="0"/>
-              <a:t>מודול זה מדמה לנו את ציר הזמן אשר מיוצג באופן דיסקרטי.</a:t>
-            </a:r>
-          </a:p>
-          <a:p>
+              <a:t>מודל </a:t>
+            </a:r>
+            <a:r>
+              <a:rPr lang="he-IL" dirty="0" err="1"/>
+              <a:t>האיבנטים</a:t>
+            </a:r>
             <a:r>
               <a:rPr lang="he-IL" dirty="0"/>
-              <a:t>בתחילת התכנית עבדנו עם זמן רציף אך לאחר בעיות מימוש רבות והתייעצות עם איל החלטנו לעבור לזמן בדיד.</a:t>
-            </a:r>
+              <a:t> הוא בעצם רשימה של סיגנלים אשר דרכו כל המודולים מתקשרים, זו מין מערכת סיגנלים.</a:t>
+            </a:r>
+          </a:p>
+          <a:p>
+            <a:endParaRPr lang="he-IL" dirty="0"/>
           </a:p>
           <a:p>
             <a:r>
               <a:rPr lang="he-IL" dirty="0"/>
-              <a:t>היתרון בזמן בדיד הוא יכולת לנרמל את ציר הזמן בקלות, יכולת מעקב אחריי הפעולות בצורה יעילה יותר.</a:t>
+              <a:t>בתחילה, מימשנו את התקשורת ישירות בין המודולים, אך זה גרר צימוד גבוה של התכנית שלנו (תלויות רבות), ולכן יצרנו את המודול הזה כדי לסדר את זה בצורה נוחה ומובנת יותר.</a:t>
             </a:r>
           </a:p>
           <a:p>
@@ -8894,72 +9278,48 @@
           <a:p>
             <a:r>
               <a:rPr lang="he-IL" dirty="0"/>
-              <a:t>ערך השעון – מספר יחידות הזמן שעברו.</a:t>
-            </a:r>
+              <a:t>לעבור בקטנה על הטבלה בצד ולהסביר על כל סיגנל.</a:t>
+            </a:r>
+          </a:p>
+          <a:p>
+            <a:endParaRPr lang="he-IL" dirty="0"/>
+          </a:p>
+          <a:p>
+            <a:endParaRPr lang="he-IL" dirty="0"/>
           </a:p>
           <a:p>
             <a:r>
               <a:rPr lang="he-IL" dirty="0"/>
-              <a:t>אפסילון – ערך זה מכווץ או מותח את ציר הזמן.</a:t>
+              <a:t>מודול אשר מרכז את התקשורת עבור כלל התכנית.</a:t>
             </a:r>
           </a:p>
           <a:p>
             <a:r>
               <a:rPr lang="he-IL" dirty="0"/>
-              <a:t>אפס – כיוון שאפסילון יכול להיות מאוד קטן יש בעיה של ייצוג מספרים לא שלמים במחשב ולכן נאלצנו לייצר "0" כך שנוכל להשוות אליו זמנים דיסקרטיים בצורה נכונה.</a:t>
-            </a:r>
-          </a:p>
-          <a:p>
-            <a:endParaRPr lang="he-IL" dirty="0"/>
+              <a:t>שאר המודולים מדברים דרכו דרך מערכת סיגנלים.</a:t>
+            </a:r>
           </a:p>
           <a:p>
             <a:r>
               <a:rPr lang="he-IL" dirty="0"/>
-              <a:t>השעון מבצע לולאה אינסופית אשר בכל איטרציה:</a:t>
-            </a:r>
-          </a:p>
-          <a:p>
-            <a:pPr marL="228600" indent="-228600">
-              <a:buAutoNum type="arabicPeriod"/>
-            </a:pPr>
+              <a:t>בתחילת המימוש התקשורת התבצעה ישירות בין </a:t>
+            </a:r>
+            <a:r>
+              <a:rPr lang="he-IL" dirty="0" err="1"/>
+              <a:t>המודלוים</a:t>
+            </a:r>
             <a:r>
               <a:rPr lang="he-IL" dirty="0"/>
-              <a:t>נבדק האם הטסט הסתיים.</a:t>
-            </a:r>
-          </a:p>
-          <a:p>
-            <a:pPr marL="228600" indent="-228600">
-              <a:buAutoNum type="arabicPeriod"/>
-            </a:pPr>
+              <a:t> מה שגרר צימוד גבוה של התכנית שלנו ולכן יצרנו מודול זה על מנת לבטל את התלויות החזקות שנוצרו </a:t>
+            </a:r>
+            <a:r>
+              <a:rPr lang="he-IL" dirty="0" err="1"/>
+              <a:t>בתכנית</a:t>
+            </a:r>
             <a:r>
               <a:rPr lang="he-IL" dirty="0"/>
-              <a:t>נבדק האם יש צורך בקידום השעון (כתלות בפעולות שהתבצעו בסימולטור ובבקר).</a:t>
-            </a:r>
-          </a:p>
-          <a:p>
-            <a:pPr marL="228600" indent="-228600">
-              <a:buAutoNum type="arabicPeriod"/>
-            </a:pPr>
-            <a:r>
-              <a:rPr lang="he-IL" dirty="0" err="1"/>
-              <a:t>עידכון</a:t>
-            </a:r>
-            <a:r>
-              <a:rPr lang="he-IL" dirty="0"/>
-              <a:t> כלל העוקבים כי התבצע\לא התבצע אירוע שעון.</a:t>
-            </a:r>
-          </a:p>
-          <a:p>
-            <a:pPr marL="228600" indent="-228600">
-              <a:buAutoNum type="arabicPeriod"/>
-            </a:pPr>
-            <a:endParaRPr lang="he-IL" dirty="0"/>
-          </a:p>
-          <a:p>
-            <a:pPr marL="228600" indent="-228600">
-              <a:buAutoNum type="arabicPeriod"/>
-            </a:pPr>
-            <a:endParaRPr lang="he-IL" dirty="0"/>
+              <a:t>.</a:t>
+            </a:r>
           </a:p>
         </p:txBody>
       </p:sp>
@@ -9003,7 +9363,7 @@
           <a:p>
             <a:fld id="{5D87C9B3-3F36-45D2-B699-10C699E739B9}" type="slidenum">
               <a:rPr lang="he-IL" smtClean="0"/>
-              <a:t>23</a:t>
+              <a:t>22</a:t>
             </a:fld>
             <a:endParaRPr lang="he-IL"/>
           </a:p>
@@ -9012,7 +9372,7 @@
     </p:spTree>
     <p:extLst>
       <p:ext uri="{BB962C8B-B14F-4D97-AF65-F5344CB8AC3E}">
-        <p14:creationId xmlns:p14="http://schemas.microsoft.com/office/powerpoint/2010/main" val="3802725460"/>
+        <p14:creationId xmlns:p14="http://schemas.microsoft.com/office/powerpoint/2010/main" val="3654397469"/>
       </p:ext>
     </p:extLst>
   </p:cSld>
@@ -9068,25 +9428,49 @@
           <a:p>
             <a:r>
               <a:rPr lang="he-IL" dirty="0"/>
-              <a:t>מודול זה מייצג את מצב העולם ומתעדכן בעקבות הסימולטור.</a:t>
+              <a:t>מודול זה מדמה לנו את ציר הזמן אשר מיוצג באופן דיסקרטי.</a:t>
             </a:r>
           </a:p>
           <a:p>
             <a:r>
               <a:rPr lang="he-IL" dirty="0"/>
-              <a:t>המודול מחזיק וקטור של מטוסים אשר כל תא במערך מייצג את המצב של המטוס באינדקס המתאים. (להסביר על המצבים השונים).</a:t>
+              <a:t>בתחילת התכנית עבדנו עם זמן רציף אך לאחר בעיות מימוש רבות והתייעצות עם איל החלטנו לעבור לזמן בדיד.</a:t>
             </a:r>
           </a:p>
           <a:p>
             <a:r>
               <a:rPr lang="he-IL" dirty="0"/>
-              <a:t>המודול מחזיק וקטור של נתיבים כאשר כל תא במערך מייצג האם הנתיב פנוי(-1) או שהנתיב תפוס ואז הערך הוא המספר המזהה של המטוס באותו נתיב.</a:t>
-            </a:r>
+              <a:t>היתרון בזמן בדיד הוא היכולת לנרמל את ציר הזמן בקלות, יכולת מעקב אחרי הפעולות בצורה יעילה יותר.</a:t>
+            </a:r>
+          </a:p>
+          <a:p>
+            <a:endParaRPr lang="he-IL" dirty="0"/>
           </a:p>
           <a:p>
             <a:r>
               <a:rPr lang="he-IL" dirty="0"/>
-              <a:t>מטרת מודול זה הוא:</a:t>
+              <a:t>ערך השעון – מספר יחידות הזמן שעברו.</a:t>
+            </a:r>
+          </a:p>
+          <a:p>
+            <a:r>
+              <a:rPr lang="he-IL" dirty="0"/>
+              <a:t>אפסילון – ערך זה מכווץ או מותח את ציר הזמן.</a:t>
+            </a:r>
+          </a:p>
+          <a:p>
+            <a:r>
+              <a:rPr lang="he-IL" dirty="0"/>
+              <a:t>אפס – כיוון שאפסילון יכול להיות מאוד קטן יש בעיה של ייצוג מספרים לא שלמים במחשב ולכן נאלצנו לייצר "0" כך שנוכל להשוות אליו זמנים דיסקרטיים בצורה נכונה.</a:t>
+            </a:r>
+          </a:p>
+          <a:p>
+            <a:endParaRPr lang="he-IL" dirty="0"/>
+          </a:p>
+          <a:p>
+            <a:r>
+              <a:rPr lang="he-IL" dirty="0"/>
+              <a:t>השעון מבצע לולאה אינסופית אשר בכל איטרציה:</a:t>
             </a:r>
           </a:p>
           <a:p>
@@ -9095,15 +9479,7 @@
             </a:pPr>
             <a:r>
               <a:rPr lang="he-IL" dirty="0"/>
-              <a:t>לממש את פונקציית החוקיות שהבקר קורא לה </a:t>
-            </a:r>
-            <a:r>
-              <a:rPr lang="he-IL" dirty="0" err="1"/>
-              <a:t>והלחזיר</a:t>
-            </a:r>
-            <a:r>
-              <a:rPr lang="he-IL" dirty="0"/>
-              <a:t> האם המצב הבא חוקי או לא.</a:t>
+              <a:t>נבדק האם הטסט הסתיים.</a:t>
             </a:r>
           </a:p>
           <a:p>
@@ -9112,7 +9488,16 @@
             </a:pPr>
             <a:r>
               <a:rPr lang="he-IL" dirty="0"/>
-              <a:t>לבצע הקפאה של מצב העולם וכתיבת קובץ קונפיגורציה חדש במידה ונדרש תיכנון מחדש, תיכנון מחדש מתרחש בעקבות החזרת ערך שגיאה מפונקציית החוקיות.</a:t>
+              <a:t>נבדק האם יש צורך בקידום השעון (כתלות בפעולות שהתבצעו בסימולטור ובבקר).</a:t>
+            </a:r>
+          </a:p>
+          <a:p>
+            <a:pPr marL="228600" indent="-228600">
+              <a:buAutoNum type="arabicPeriod"/>
+            </a:pPr>
+            <a:r>
+              <a:rPr lang="he-IL" dirty="0"/>
+              <a:t>עדכון כלל העוקבים כי התבצע\לא התבצע אירוע שעון.</a:t>
             </a:r>
           </a:p>
           <a:p>
@@ -9122,8 +9507,8 @@
             <a:endParaRPr lang="he-IL" dirty="0"/>
           </a:p>
           <a:p>
-            <a:pPr marL="0" indent="0">
-              <a:buNone/>
+            <a:pPr marL="228600" indent="-228600">
+              <a:buAutoNum type="arabicPeriod"/>
             </a:pPr>
             <a:endParaRPr lang="he-IL" dirty="0"/>
           </a:p>
@@ -9169,7 +9554,7 @@
           <a:p>
             <a:fld id="{5D87C9B3-3F36-45D2-B699-10C699E739B9}" type="slidenum">
               <a:rPr lang="he-IL" smtClean="0"/>
-              <a:t>24</a:t>
+              <a:t>23</a:t>
             </a:fld>
             <a:endParaRPr lang="he-IL"/>
           </a:p>
@@ -9178,7 +9563,7 @@
     </p:spTree>
     <p:extLst>
       <p:ext uri="{BB962C8B-B14F-4D97-AF65-F5344CB8AC3E}">
-        <p14:creationId xmlns:p14="http://schemas.microsoft.com/office/powerpoint/2010/main" val="202044522"/>
+        <p14:creationId xmlns:p14="http://schemas.microsoft.com/office/powerpoint/2010/main" val="3802725460"/>
       </p:ext>
     </p:extLst>
   </p:cSld>
@@ -9234,52 +9619,11 @@
           <a:p>
             <a:r>
               <a:rPr lang="he-IL" dirty="0"/>
-              <a:t>מודול זה מייצג את מצב העולם ומתעדכן בעקבות הסימולטור.</a:t>
-            </a:r>
-          </a:p>
-          <a:p>
-            <a:r>
-              <a:rPr lang="he-IL" dirty="0"/>
-              <a:t>המודול מחזיק וקטור של מטוסים אשר כל תא במערך מייצג את המצב של המטוס באינדקס המתאים. (להסביר על המצבים השונים).</a:t>
-            </a:r>
-          </a:p>
-          <a:p>
-            <a:r>
-              <a:rPr lang="he-IL" dirty="0"/>
-              <a:t>המודול מחזיק וקטור של נתיבים כאשר כל תא במערך מייצג האם הנתיב פנוי(-1) או שהנתיב תפוס ואז הערך הוא המספר המזהה של המטוס באותו נתיב.</a:t>
-            </a:r>
-          </a:p>
-          <a:p>
-            <a:r>
-              <a:rPr lang="he-IL" dirty="0"/>
-              <a:t>מטרת מודול זה הוא:</a:t>
-            </a:r>
-          </a:p>
-          <a:p>
-            <a:pPr marL="228600" indent="-228600">
-              <a:buAutoNum type="arabicPeriod"/>
-            </a:pPr>
-            <a:r>
-              <a:rPr lang="he-IL" dirty="0"/>
-              <a:t>לממש את פונקציית החוקיות שהבקר קורא לה </a:t>
-            </a:r>
-            <a:r>
-              <a:rPr lang="he-IL" dirty="0" err="1"/>
-              <a:t>והלחזיר</a:t>
-            </a:r>
-            <a:r>
-              <a:rPr lang="he-IL" dirty="0"/>
-              <a:t> האם המצב הבא חוקי או לא.</a:t>
-            </a:r>
-          </a:p>
-          <a:p>
-            <a:pPr marL="228600" indent="-228600">
-              <a:buAutoNum type="arabicPeriod"/>
-            </a:pPr>
-            <a:r>
-              <a:rPr lang="he-IL" dirty="0"/>
-              <a:t>לבצע הקפאה של מצב העולם וכתיבת קובץ קונפיגורציה חדש במידה ונדרש תיכנון מחדש, תיכנון מחדש מתרחש בעקבות החזרת ערך שגיאה מפונקציית החוקיות.</a:t>
-            </a:r>
+              <a:t>אפס – כיוון שאפסילון יכול להיות מאוד קטן יש בעיה של ייצוג מספרים לא שלמים במחשב ולכן נאלצנו לייצר "0" כך שנוכל להשוות אליו זמנים דיסקרטיים בצורה נכונה.</a:t>
+            </a:r>
+          </a:p>
+          <a:p>
+            <a:endParaRPr lang="he-IL" dirty="0"/>
           </a:p>
           <a:p>
             <a:pPr marL="228600" indent="-228600">
@@ -9335,7 +9679,7 @@
           <a:p>
             <a:fld id="{5D87C9B3-3F36-45D2-B699-10C699E739B9}" type="slidenum">
               <a:rPr lang="he-IL" smtClean="0"/>
-              <a:t>25</a:t>
+              <a:t>24</a:t>
             </a:fld>
             <a:endParaRPr lang="he-IL"/>
           </a:p>
@@ -9344,7 +9688,7 @@
     </p:spTree>
     <p:extLst>
       <p:ext uri="{BB962C8B-B14F-4D97-AF65-F5344CB8AC3E}">
-        <p14:creationId xmlns:p14="http://schemas.microsoft.com/office/powerpoint/2010/main" val="2849164166"/>
+        <p14:creationId xmlns:p14="http://schemas.microsoft.com/office/powerpoint/2010/main" val="2045717316"/>
       </p:ext>
     </p:extLst>
   </p:cSld>
@@ -9398,37 +9742,27 @@
           <a:bodyPr/>
           <a:lstStyle/>
           <a:p>
-            <a:pPr marL="0" indent="0">
-              <a:buNone/>
-            </a:pPr>
             <a:r>
               <a:rPr lang="he-IL" dirty="0"/>
-              <a:t>המודל מייצר הפרעות אשר נשלחות לסימולטור, הפרעה היא משך זמן שמתווסף למשך זמן של פעולה </a:t>
-            </a:r>
-            <a:r>
-              <a:rPr lang="he-IL" dirty="0" err="1"/>
-              <a:t>מסויימת</a:t>
-            </a:r>
+              <a:t>מודול זה מייצג את מצב העולם ומתעדכן בעקבות הסימולטור.</a:t>
+            </a:r>
+          </a:p>
+          <a:p>
             <a:r>
               <a:rPr lang="he-IL" dirty="0"/>
-              <a:t>.</a:t>
-            </a:r>
-          </a:p>
-          <a:p>
-            <a:pPr marL="0" indent="0">
-              <a:buNone/>
-            </a:pPr>
+              <a:t>המודול מחזיק וקטור של מטוסים אשר כל תא במערך מייצג את המצב של המטוס באינדקס המתאים. (להסביר על המצבים השונים).</a:t>
+            </a:r>
+          </a:p>
+          <a:p>
             <a:r>
               <a:rPr lang="he-IL" dirty="0"/>
-              <a:t>המודל הוא </a:t>
-            </a:r>
-            <a:r>
-              <a:rPr lang="he-IL" dirty="0" err="1"/>
-              <a:t>פסודו</a:t>
-            </a:r>
+              <a:t>המודול מחזיק וקטור של נתיבים כאשר כל תא במערך מייצג האם הנתיב פנוי(-1) או שהנתיב תפוס ואז הערך הוא המספר המזהה של המטוס באותו נתיב.</a:t>
+            </a:r>
+          </a:p>
+          <a:p>
             <a:r>
               <a:rPr lang="he-IL" dirty="0"/>
-              <a:t> רנדומלי בשני מובנים:</a:t>
+              <a:t>מטרת מודול זה הוא:</a:t>
             </a:r>
           </a:p>
           <a:p>
@@ -9437,7 +9771,7 @@
             </a:pPr>
             <a:r>
               <a:rPr lang="he-IL" dirty="0"/>
-              <a:t>תדירות יצירת ההפרעה הוא מספר אקראי בין 1-ל4 פעולות.</a:t>
+              <a:t>לממש את פונקציית החוקיות שהבקר קורא לה ולהחזיר האם המצב הבא חוקי או לא.</a:t>
             </a:r>
           </a:p>
           <a:p>
@@ -9446,15 +9780,7 @@
             </a:pPr>
             <a:r>
               <a:rPr lang="he-IL" dirty="0"/>
-              <a:t>משך ההפרעה הוא משתנה אקראי מפולג </a:t>
-            </a:r>
-            <a:r>
-              <a:rPr lang="he-IL" dirty="0" err="1"/>
-              <a:t>יוניפורמי</a:t>
-            </a:r>
-            <a:r>
-              <a:rPr lang="he-IL" dirty="0"/>
-              <a:t> בין מחצית משך הפעולה שנבחה לבין משך הפעולה שנבחרה.</a:t>
+              <a:t>לבצע הקפאה של מצב העולם וכתיבת קובץ קונפיגורציה חדש במידה ונדרש תיכנון מחדש, תיכנון מחדש מתרחש בעקבות החזרת ערך שגיאה מפונקציית החוקיות.</a:t>
             </a:r>
           </a:p>
           <a:p>
@@ -9467,15 +9793,6 @@
             <a:pPr marL="0" indent="0">
               <a:buNone/>
             </a:pPr>
-            <a:r>
-              <a:rPr lang="he-IL" dirty="0"/>
-              <a:t>כאשר נוצרה הפרעה המודול יאותת למודול הסימולטור על הפרעה שנוצרה ויאפס את תדירות יצירת ההפרעה.</a:t>
-            </a:r>
-          </a:p>
-          <a:p>
-            <a:pPr marL="0" indent="0">
-              <a:buNone/>
-            </a:pPr>
             <a:endParaRPr lang="he-IL" dirty="0"/>
           </a:p>
         </p:txBody>
@@ -9520,7 +9837,7 @@
           <a:p>
             <a:fld id="{5D87C9B3-3F36-45D2-B699-10C699E739B9}" type="slidenum">
               <a:rPr lang="he-IL" smtClean="0"/>
-              <a:t>26</a:t>
+              <a:t>25</a:t>
             </a:fld>
             <a:endParaRPr lang="he-IL"/>
           </a:p>
@@ -9529,7 +9846,7 @@
     </p:spTree>
     <p:extLst>
       <p:ext uri="{BB962C8B-B14F-4D97-AF65-F5344CB8AC3E}">
-        <p14:creationId xmlns:p14="http://schemas.microsoft.com/office/powerpoint/2010/main" val="546992971"/>
+        <p14:creationId xmlns:p14="http://schemas.microsoft.com/office/powerpoint/2010/main" val="202044522"/>
       </p:ext>
     </p:extLst>
   </p:cSld>
@@ -9585,8 +9902,64 @@
           <a:p>
             <a:r>
               <a:rPr lang="he-IL" dirty="0"/>
-              <a:t>תוצאה רגילה</a:t>
-            </a:r>
+              <a:t>מודול זה מייצג את מצב העולם ומתעדכן בעקבות הסימולטור.</a:t>
+            </a:r>
+          </a:p>
+          <a:p>
+            <a:r>
+              <a:rPr lang="he-IL" dirty="0"/>
+              <a:t>המודול מחזיק וקטור של מטוסים אשר כל תא במערך מייצג את המצב של המטוס באינדקס המתאים. (להסביר על המצבים השונים).</a:t>
+            </a:r>
+          </a:p>
+          <a:p>
+            <a:r>
+              <a:rPr lang="he-IL" dirty="0"/>
+              <a:t>המודול מחזיק וקטור של נתיבים כאשר כל תא במערך מייצג האם הנתיב פנוי(-1) או שהנתיב תפוס ואז הערך הוא המספר המזהה של המטוס באותו נתיב.</a:t>
+            </a:r>
+          </a:p>
+          <a:p>
+            <a:r>
+              <a:rPr lang="he-IL" dirty="0"/>
+              <a:t>מטרת מודול זה הוא:</a:t>
+            </a:r>
+          </a:p>
+          <a:p>
+            <a:pPr marL="228600" indent="-228600">
+              <a:buAutoNum type="arabicPeriod"/>
+            </a:pPr>
+            <a:r>
+              <a:rPr lang="he-IL" dirty="0"/>
+              <a:t>לממש את פונקציית החוקיות שהבקר קורא לה </a:t>
+            </a:r>
+            <a:r>
+              <a:rPr lang="he-IL" dirty="0" err="1"/>
+              <a:t>והלחזיר</a:t>
+            </a:r>
+            <a:r>
+              <a:rPr lang="he-IL" dirty="0"/>
+              <a:t> האם המצב הבא חוקי או לא.</a:t>
+            </a:r>
+          </a:p>
+          <a:p>
+            <a:pPr marL="228600" indent="-228600">
+              <a:buAutoNum type="arabicPeriod"/>
+            </a:pPr>
+            <a:r>
+              <a:rPr lang="he-IL" dirty="0"/>
+              <a:t>לבצע הקפאה של מצב העולם וכתיבת קובץ קונפיגורציה חדש במידה ונדרש תיכנון מחדש, תיכנון מחדש מתרחש בעקבות החזרת ערך שגיאה מפונקציית החוקיות.</a:t>
+            </a:r>
+          </a:p>
+          <a:p>
+            <a:pPr marL="228600" indent="-228600">
+              <a:buAutoNum type="arabicPeriod"/>
+            </a:pPr>
+            <a:endParaRPr lang="he-IL" dirty="0"/>
+          </a:p>
+          <a:p>
+            <a:pPr marL="0" indent="0">
+              <a:buNone/>
+            </a:pPr>
+            <a:endParaRPr lang="he-IL" dirty="0"/>
           </a:p>
         </p:txBody>
       </p:sp>
@@ -9630,7 +10003,7 @@
           <a:p>
             <a:fld id="{5D87C9B3-3F36-45D2-B699-10C699E739B9}" type="slidenum">
               <a:rPr lang="he-IL" smtClean="0"/>
-              <a:t>27</a:t>
+              <a:t>26</a:t>
             </a:fld>
             <a:endParaRPr lang="he-IL"/>
           </a:p>
@@ -9639,7 +10012,7 @@
     </p:spTree>
     <p:extLst>
       <p:ext uri="{BB962C8B-B14F-4D97-AF65-F5344CB8AC3E}">
-        <p14:creationId xmlns:p14="http://schemas.microsoft.com/office/powerpoint/2010/main" val="2318995915"/>
+        <p14:creationId xmlns:p14="http://schemas.microsoft.com/office/powerpoint/2010/main" val="2849164166"/>
       </p:ext>
     </p:extLst>
   </p:cSld>
@@ -9693,10 +10066,101 @@
           <a:bodyPr/>
           <a:lstStyle/>
           <a:p>
+            <a:pPr marL="0" indent="0">
+              <a:buNone/>
+            </a:pPr>
             <a:r>
               <a:rPr lang="he-IL" dirty="0"/>
-              <a:t>תוצאה עם תיכנון מחדש</a:t>
-            </a:r>
+              <a:t>המודל מייצר הפרעות אשר נשלחות לסימולטור, הפרעה יכולה להתפרש כ-2 מצבים:</a:t>
+            </a:r>
+          </a:p>
+          <a:p>
+            <a:pPr marL="228600" indent="-228600">
+              <a:buAutoNum type="arabicPeriod"/>
+            </a:pPr>
+            <a:r>
+              <a:rPr lang="he-IL" dirty="0"/>
+              <a:t>דחייה של פעולה מסוימת (דחייה של ההמראה)</a:t>
+            </a:r>
+          </a:p>
+          <a:p>
+            <a:pPr marL="228600" indent="-228600">
+              <a:buAutoNum type="arabicPeriod"/>
+            </a:pPr>
+            <a:r>
+              <a:rPr lang="he-IL" dirty="0"/>
+              <a:t>עיכוב של פעולה מסוימת (הארכת זמן המשימה המקורי של המטוס)</a:t>
+            </a:r>
+          </a:p>
+          <a:p>
+            <a:pPr marL="228600" indent="-228600">
+              <a:buAutoNum type="arabicPeriod"/>
+            </a:pPr>
+            <a:endParaRPr lang="he-IL" dirty="0"/>
+          </a:p>
+          <a:p>
+            <a:pPr marL="0" indent="0">
+              <a:buNone/>
+            </a:pPr>
+            <a:r>
+              <a:rPr lang="he-IL" dirty="0"/>
+              <a:t>המודל הוא </a:t>
+            </a:r>
+            <a:r>
+              <a:rPr lang="he-IL" dirty="0" err="1"/>
+              <a:t>פסודו</a:t>
+            </a:r>
+            <a:r>
+              <a:rPr lang="he-IL" dirty="0"/>
+              <a:t> רנדומלי בשני מובנים:</a:t>
+            </a:r>
+          </a:p>
+          <a:p>
+            <a:pPr marL="228600" indent="-228600">
+              <a:buAutoNum type="arabicPeriod"/>
+            </a:pPr>
+            <a:r>
+              <a:rPr lang="he-IL" dirty="0"/>
+              <a:t>תדירות יצירת ההפרעה הוא מספר אקראי בין 1-ל4 פעולות.</a:t>
+            </a:r>
+          </a:p>
+          <a:p>
+            <a:pPr marL="228600" indent="-228600">
+              <a:buAutoNum type="arabicPeriod"/>
+            </a:pPr>
+            <a:r>
+              <a:rPr lang="he-IL" dirty="0"/>
+              <a:t>משך ההפרעה הוא משתנה אקראי מפולג </a:t>
+            </a:r>
+            <a:r>
+              <a:rPr lang="he-IL" dirty="0" err="1"/>
+              <a:t>יוניפורמי</a:t>
+            </a:r>
+            <a:r>
+              <a:rPr lang="he-IL" dirty="0"/>
+              <a:t> בין מחצית משך הפעולה שנבחה לבין משך הפעולה שנבחרה.</a:t>
+            </a:r>
+          </a:p>
+          <a:p>
+            <a:pPr marL="228600" indent="-228600">
+              <a:buAutoNum type="arabicPeriod"/>
+            </a:pPr>
+            <a:endParaRPr lang="he-IL" dirty="0"/>
+          </a:p>
+          <a:p>
+            <a:pPr marL="0" indent="0">
+              <a:buNone/>
+            </a:pPr>
+            <a:r>
+              <a:rPr lang="he-IL" dirty="0"/>
+              <a:t>כאשר נוצרה הפרעה המודול יאותת למודול הסימולטור על הפרעה שנוצרה ויאפס את תדירות יצירת ההפרעה.</a:t>
+            </a:r>
+          </a:p>
+          <a:p>
+            <a:pPr marL="0" indent="0">
+              <a:buNone/>
+            </a:pPr>
+            <a:endParaRPr lang="he-IL" dirty="0"/>
           </a:p>
         </p:txBody>
       </p:sp>
@@ -9740,7 +10204,7 @@
           <a:p>
             <a:fld id="{5D87C9B3-3F36-45D2-B699-10C699E739B9}" type="slidenum">
               <a:rPr lang="he-IL" smtClean="0"/>
-              <a:t>28</a:t>
+              <a:t>27</a:t>
             </a:fld>
             <a:endParaRPr lang="he-IL"/>
           </a:p>
@@ -9749,7 +10213,7 @@
     </p:spTree>
     <p:extLst>
       <p:ext uri="{BB962C8B-B14F-4D97-AF65-F5344CB8AC3E}">
-        <p14:creationId xmlns:p14="http://schemas.microsoft.com/office/powerpoint/2010/main" val="1660480528"/>
+        <p14:creationId xmlns:p14="http://schemas.microsoft.com/office/powerpoint/2010/main" val="546992971"/>
       </p:ext>
     </p:extLst>
   </p:cSld>
@@ -9803,85 +10267,120 @@
           <a:bodyPr/>
           <a:lstStyle/>
           <a:p>
-            <a:pPr marL="0" indent="0">
-              <a:buNone/>
-            </a:pPr>
             <a:r>
               <a:rPr lang="he-IL" dirty="0"/>
-              <a:t>המודל מייצר הפרעות אשר נשלחות לסימולטור, הפרעה היא משך זמן שמתווסף למשך זמן של פעולה </a:t>
-            </a:r>
-            <a:r>
-              <a:rPr lang="he-IL" dirty="0" err="1"/>
-              <a:t>מסויימת</a:t>
-            </a:r>
+              <a:t>תוצאה רגילה</a:t>
+            </a:r>
+          </a:p>
+        </p:txBody>
+      </p:sp>
+      <p:sp>
+        <p:nvSpPr>
+          <p:cNvPr id="4" name="מציין מיקום של כותרת עליונה 3"/>
+          <p:cNvSpPr>
+            <a:spLocks noGrp="1"/>
+          </p:cNvSpPr>
+          <p:nvPr>
+            <p:ph type="hdr" sz="quarter"/>
+          </p:nvPr>
+        </p:nvSpPr>
+        <p:spPr/>
+        <p:txBody>
+          <a:bodyPr/>
+          <a:lstStyle/>
+          <a:p>
+            <a:r>
+              <a:rPr lang="en-US"/>
+              <a:t>hjfhgdhgfdfgh</a:t>
+            </a:r>
+            <a:endParaRPr lang="he-IL"/>
+          </a:p>
+        </p:txBody>
+      </p:sp>
+      <p:sp>
+        <p:nvSpPr>
+          <p:cNvPr id="5" name="מציין מיקום של מספר שקופית 4"/>
+          <p:cNvSpPr>
+            <a:spLocks noGrp="1"/>
+          </p:cNvSpPr>
+          <p:nvPr>
+            <p:ph type="sldNum" sz="quarter" idx="5"/>
+          </p:nvPr>
+        </p:nvSpPr>
+        <p:spPr/>
+        <p:txBody>
+          <a:bodyPr/>
+          <a:lstStyle/>
+          <a:p>
+            <a:fld id="{5D87C9B3-3F36-45D2-B699-10C699E739B9}" type="slidenum">
+              <a:rPr lang="he-IL" smtClean="0"/>
+              <a:t>28</a:t>
+            </a:fld>
+            <a:endParaRPr lang="he-IL"/>
+          </a:p>
+        </p:txBody>
+      </p:sp>
+    </p:spTree>
+    <p:extLst>
+      <p:ext uri="{BB962C8B-B14F-4D97-AF65-F5344CB8AC3E}">
+        <p14:creationId xmlns:p14="http://schemas.microsoft.com/office/powerpoint/2010/main" val="2318995915"/>
+      </p:ext>
+    </p:extLst>
+  </p:cSld>
+  <p:clrMapOvr>
+    <a:masterClrMapping/>
+  </p:clrMapOvr>
+</p:notes>
+</file>
+
+<file path=ppt/notesSlides/notesSlide29.xml><?xml version="1.0" encoding="utf-8"?>
+<p:notes xmlns:a="http://schemas.openxmlformats.org/drawingml/2006/main" xmlns:r="http://schemas.openxmlformats.org/officeDocument/2006/relationships" xmlns:p="http://schemas.openxmlformats.org/presentationml/2006/main">
+  <p:cSld>
+    <p:spTree>
+      <p:nvGrpSpPr>
+        <p:cNvPr id="1" name=""/>
+        <p:cNvGrpSpPr/>
+        <p:nvPr/>
+      </p:nvGrpSpPr>
+      <p:grpSpPr>
+        <a:xfrm>
+          <a:off x="0" y="0"/>
+          <a:ext cx="0" cy="0"/>
+          <a:chOff x="0" y="0"/>
+          <a:chExt cx="0" cy="0"/>
+        </a:xfrm>
+      </p:grpSpPr>
+      <p:sp>
+        <p:nvSpPr>
+          <p:cNvPr id="2" name="מציין מיקום של תמונת שקופית 1"/>
+          <p:cNvSpPr>
+            <a:spLocks noGrp="1" noRot="1" noChangeAspect="1"/>
+          </p:cNvSpPr>
+          <p:nvPr>
+            <p:ph type="sldImg"/>
+          </p:nvPr>
+        </p:nvSpPr>
+        <p:spPr/>
+      </p:sp>
+      <p:sp>
+        <p:nvSpPr>
+          <p:cNvPr id="3" name="מציין מיקום של הערות 2"/>
+          <p:cNvSpPr>
+            <a:spLocks noGrp="1"/>
+          </p:cNvSpPr>
+          <p:nvPr>
+            <p:ph type="body" idx="1"/>
+          </p:nvPr>
+        </p:nvSpPr>
+        <p:spPr/>
+        <p:txBody>
+          <a:bodyPr/>
+          <a:lstStyle/>
+          <a:p>
             <a:r>
               <a:rPr lang="he-IL" dirty="0"/>
-              <a:t>.</a:t>
-            </a:r>
-          </a:p>
-          <a:p>
-            <a:pPr marL="0" indent="0">
-              <a:buNone/>
-            </a:pPr>
-            <a:r>
-              <a:rPr lang="he-IL" dirty="0"/>
-              <a:t>המודל הוא </a:t>
-            </a:r>
-            <a:r>
-              <a:rPr lang="he-IL" dirty="0" err="1"/>
-              <a:t>פסודו</a:t>
-            </a:r>
-            <a:r>
-              <a:rPr lang="he-IL" dirty="0"/>
-              <a:t> רנדומלי בשני מובנים:</a:t>
-            </a:r>
-          </a:p>
-          <a:p>
-            <a:pPr marL="228600" indent="-228600">
-              <a:buAutoNum type="arabicPeriod"/>
-            </a:pPr>
-            <a:r>
-              <a:rPr lang="he-IL" dirty="0"/>
-              <a:t>תדירות יצירת ההפרעה הוא מספר אקראי בין 1-ל4 פעולות.</a:t>
-            </a:r>
-          </a:p>
-          <a:p>
-            <a:pPr marL="228600" indent="-228600">
-              <a:buAutoNum type="arabicPeriod"/>
-            </a:pPr>
-            <a:r>
-              <a:rPr lang="he-IL" dirty="0"/>
-              <a:t>משך ההפרעה הוא משתנה אקראי מפולג </a:t>
-            </a:r>
-            <a:r>
-              <a:rPr lang="he-IL" dirty="0" err="1"/>
-              <a:t>יוניפורמי</a:t>
-            </a:r>
-            <a:r>
-              <a:rPr lang="he-IL" dirty="0"/>
-              <a:t> בין מחצית משך הפעולה שנבחה לבין משך הפעולה שנבחרה.</a:t>
-            </a:r>
-          </a:p>
-          <a:p>
-            <a:pPr marL="228600" indent="-228600">
-              <a:buAutoNum type="arabicPeriod"/>
-            </a:pPr>
-            <a:endParaRPr lang="he-IL" dirty="0"/>
-          </a:p>
-          <a:p>
-            <a:pPr marL="0" indent="0">
-              <a:buNone/>
-            </a:pPr>
-            <a:r>
-              <a:rPr lang="he-IL" dirty="0"/>
-              <a:t>כאשר נוצרה הפרעה המודול יאותת למודול הסימולטור על הפרעה שנוצרה ויאפס את תדירות יצירת ההפרעה.</a:t>
-            </a:r>
-          </a:p>
-          <a:p>
-            <a:pPr marL="0" indent="0">
-              <a:buNone/>
-            </a:pPr>
-            <a:endParaRPr lang="he-IL" dirty="0"/>
+              <a:t>תוצאה עם תיכנון מחדש</a:t>
+            </a:r>
           </a:p>
         </p:txBody>
       </p:sp>
@@ -9934,7 +10433,7 @@
     </p:spTree>
     <p:extLst>
       <p:ext uri="{BB962C8B-B14F-4D97-AF65-F5344CB8AC3E}">
-        <p14:creationId xmlns:p14="http://schemas.microsoft.com/office/powerpoint/2010/main" val="916540336"/>
+        <p14:creationId xmlns:p14="http://schemas.microsoft.com/office/powerpoint/2010/main" val="1660480528"/>
       </p:ext>
     </p:extLst>
   </p:cSld>
@@ -10138,6 +10637,270 @@
     <p:extLst>
       <p:ext uri="{BB962C8B-B14F-4D97-AF65-F5344CB8AC3E}">
         <p14:creationId xmlns:p14="http://schemas.microsoft.com/office/powerpoint/2010/main" val="1875335535"/>
+      </p:ext>
+    </p:extLst>
+  </p:cSld>
+  <p:clrMapOvr>
+    <a:masterClrMapping/>
+  </p:clrMapOvr>
+</p:notes>
+</file>
+
+<file path=ppt/notesSlides/notesSlide30.xml><?xml version="1.0" encoding="utf-8"?>
+<p:notes xmlns:a="http://schemas.openxmlformats.org/drawingml/2006/main" xmlns:r="http://schemas.openxmlformats.org/officeDocument/2006/relationships" xmlns:p="http://schemas.openxmlformats.org/presentationml/2006/main">
+  <p:cSld>
+    <p:spTree>
+      <p:nvGrpSpPr>
+        <p:cNvPr id="1" name=""/>
+        <p:cNvGrpSpPr/>
+        <p:nvPr/>
+      </p:nvGrpSpPr>
+      <p:grpSpPr>
+        <a:xfrm>
+          <a:off x="0" y="0"/>
+          <a:ext cx="0" cy="0"/>
+          <a:chOff x="0" y="0"/>
+          <a:chExt cx="0" cy="0"/>
+        </a:xfrm>
+      </p:grpSpPr>
+      <p:sp>
+        <p:nvSpPr>
+          <p:cNvPr id="2" name="מציין מיקום של תמונת שקופית 1"/>
+          <p:cNvSpPr>
+            <a:spLocks noGrp="1" noRot="1" noChangeAspect="1"/>
+          </p:cNvSpPr>
+          <p:nvPr>
+            <p:ph type="sldImg"/>
+          </p:nvPr>
+        </p:nvSpPr>
+        <p:spPr/>
+      </p:sp>
+      <p:sp>
+        <p:nvSpPr>
+          <p:cNvPr id="3" name="מציין מיקום של הערות 2"/>
+          <p:cNvSpPr>
+            <a:spLocks noGrp="1"/>
+          </p:cNvSpPr>
+          <p:nvPr>
+            <p:ph type="body" idx="1"/>
+          </p:nvPr>
+        </p:nvSpPr>
+        <p:spPr/>
+        <p:txBody>
+          <a:bodyPr/>
+          <a:lstStyle/>
+          <a:p>
+            <a:pPr marL="0" indent="0">
+              <a:buNone/>
+            </a:pPr>
+            <a:r>
+              <a:rPr lang="he-IL" dirty="0"/>
+              <a:t>את הפרויקט ניתן להרחיב בכמה מישורים:</a:t>
+            </a:r>
+          </a:p>
+          <a:p>
+            <a:pPr marL="228600" indent="-228600">
+              <a:buAutoNum type="arabicPeriod"/>
+            </a:pPr>
+            <a:r>
+              <a:rPr lang="he-IL" dirty="0"/>
+              <a:t>להוסיף עוד סוגי הפרעות (לדג' קיצור זמן של פעולה מעיד על תקלה) כדי לדמות עולם יותר מציאותי בסימולציה.</a:t>
+            </a:r>
+          </a:p>
+          <a:p>
+            <a:pPr marL="228600" indent="-228600">
+              <a:buAutoNum type="arabicPeriod"/>
+            </a:pPr>
+            <a:r>
+              <a:rPr lang="he-IL" dirty="0"/>
+              <a:t>הוספת </a:t>
+            </a:r>
+            <a:r>
+              <a:rPr lang="en-US" dirty="0"/>
+              <a:t>GUI</a:t>
+            </a:r>
+            <a:r>
+              <a:rPr lang="he-IL" dirty="0"/>
+              <a:t>?</a:t>
+            </a:r>
+          </a:p>
+          <a:p>
+            <a:pPr marL="228600" indent="-228600">
+              <a:buAutoNum type="arabicPeriod"/>
+            </a:pPr>
+            <a:r>
+              <a:rPr lang="he-IL" dirty="0"/>
+              <a:t>להפוך את המערכת ליותר אינטראקטיבית עבור המשתמש.</a:t>
+            </a:r>
+          </a:p>
+          <a:p>
+            <a:pPr marL="228600" indent="-228600">
+              <a:buAutoNum type="arabicPeriod"/>
+            </a:pPr>
+            <a:endParaRPr lang="he-IL" dirty="0"/>
+          </a:p>
+        </p:txBody>
+      </p:sp>
+      <p:sp>
+        <p:nvSpPr>
+          <p:cNvPr id="4" name="מציין מיקום של כותרת עליונה 3"/>
+          <p:cNvSpPr>
+            <a:spLocks noGrp="1"/>
+          </p:cNvSpPr>
+          <p:nvPr>
+            <p:ph type="hdr" sz="quarter"/>
+          </p:nvPr>
+        </p:nvSpPr>
+        <p:spPr/>
+        <p:txBody>
+          <a:bodyPr/>
+          <a:lstStyle/>
+          <a:p>
+            <a:r>
+              <a:rPr lang="en-US"/>
+              <a:t>hjfhgdhgfdfgh</a:t>
+            </a:r>
+            <a:endParaRPr lang="he-IL"/>
+          </a:p>
+        </p:txBody>
+      </p:sp>
+      <p:sp>
+        <p:nvSpPr>
+          <p:cNvPr id="5" name="מציין מיקום של מספר שקופית 4"/>
+          <p:cNvSpPr>
+            <a:spLocks noGrp="1"/>
+          </p:cNvSpPr>
+          <p:nvPr>
+            <p:ph type="sldNum" sz="quarter" idx="5"/>
+          </p:nvPr>
+        </p:nvSpPr>
+        <p:spPr/>
+        <p:txBody>
+          <a:bodyPr/>
+          <a:lstStyle/>
+          <a:p>
+            <a:fld id="{5D87C9B3-3F36-45D2-B699-10C699E739B9}" type="slidenum">
+              <a:rPr lang="he-IL" smtClean="0"/>
+              <a:t>30</a:t>
+            </a:fld>
+            <a:endParaRPr lang="he-IL"/>
+          </a:p>
+        </p:txBody>
+      </p:sp>
+    </p:spTree>
+    <p:extLst>
+      <p:ext uri="{BB962C8B-B14F-4D97-AF65-F5344CB8AC3E}">
+        <p14:creationId xmlns:p14="http://schemas.microsoft.com/office/powerpoint/2010/main" val="916540336"/>
+      </p:ext>
+    </p:extLst>
+  </p:cSld>
+  <p:clrMapOvr>
+    <a:masterClrMapping/>
+  </p:clrMapOvr>
+</p:notes>
+</file>
+
+<file path=ppt/notesSlides/notesSlide31.xml><?xml version="1.0" encoding="utf-8"?>
+<p:notes xmlns:a="http://schemas.openxmlformats.org/drawingml/2006/main" xmlns:r="http://schemas.openxmlformats.org/officeDocument/2006/relationships" xmlns:p="http://schemas.openxmlformats.org/presentationml/2006/main">
+  <p:cSld>
+    <p:spTree>
+      <p:nvGrpSpPr>
+        <p:cNvPr id="1" name=""/>
+        <p:cNvGrpSpPr/>
+        <p:nvPr/>
+      </p:nvGrpSpPr>
+      <p:grpSpPr>
+        <a:xfrm>
+          <a:off x="0" y="0"/>
+          <a:ext cx="0" cy="0"/>
+          <a:chOff x="0" y="0"/>
+          <a:chExt cx="0" cy="0"/>
+        </a:xfrm>
+      </p:grpSpPr>
+      <p:sp>
+        <p:nvSpPr>
+          <p:cNvPr id="2" name="מציין מיקום של תמונת שקופית 1"/>
+          <p:cNvSpPr>
+            <a:spLocks noGrp="1" noRot="1" noChangeAspect="1"/>
+          </p:cNvSpPr>
+          <p:nvPr>
+            <p:ph type="sldImg"/>
+          </p:nvPr>
+        </p:nvSpPr>
+        <p:spPr/>
+      </p:sp>
+      <p:sp>
+        <p:nvSpPr>
+          <p:cNvPr id="3" name="מציין מיקום של הערות 2"/>
+          <p:cNvSpPr>
+            <a:spLocks noGrp="1"/>
+          </p:cNvSpPr>
+          <p:nvPr>
+            <p:ph type="body" idx="1"/>
+          </p:nvPr>
+        </p:nvSpPr>
+        <p:spPr/>
+        <p:txBody>
+          <a:bodyPr/>
+          <a:lstStyle/>
+          <a:p>
+            <a:r>
+              <a:rPr lang="he-IL" dirty="0"/>
+              <a:t>תודה לאיל!!!!! וליואב!!!!</a:t>
+            </a:r>
+          </a:p>
+        </p:txBody>
+      </p:sp>
+      <p:sp>
+        <p:nvSpPr>
+          <p:cNvPr id="4" name="מציין מיקום של כותרת עליונה 3"/>
+          <p:cNvSpPr>
+            <a:spLocks noGrp="1"/>
+          </p:cNvSpPr>
+          <p:nvPr>
+            <p:ph type="hdr" sz="quarter"/>
+          </p:nvPr>
+        </p:nvSpPr>
+        <p:spPr/>
+        <p:txBody>
+          <a:bodyPr/>
+          <a:lstStyle/>
+          <a:p>
+            <a:r>
+              <a:rPr lang="en-US"/>
+              <a:t>hjfhgdhgfdfgh</a:t>
+            </a:r>
+            <a:endParaRPr lang="he-IL"/>
+          </a:p>
+        </p:txBody>
+      </p:sp>
+      <p:sp>
+        <p:nvSpPr>
+          <p:cNvPr id="5" name="מציין מיקום של מספר שקופית 4"/>
+          <p:cNvSpPr>
+            <a:spLocks noGrp="1"/>
+          </p:cNvSpPr>
+          <p:nvPr>
+            <p:ph type="sldNum" sz="quarter" idx="5"/>
+          </p:nvPr>
+        </p:nvSpPr>
+        <p:spPr/>
+        <p:txBody>
+          <a:bodyPr/>
+          <a:lstStyle/>
+          <a:p>
+            <a:fld id="{5D87C9B3-3F36-45D2-B699-10C699E739B9}" type="slidenum">
+              <a:rPr lang="he-IL" smtClean="0"/>
+              <a:t>31</a:t>
+            </a:fld>
+            <a:endParaRPr lang="he-IL"/>
+          </a:p>
+        </p:txBody>
+      </p:sp>
+    </p:spTree>
+    <p:extLst>
+      <p:ext uri="{BB962C8B-B14F-4D97-AF65-F5344CB8AC3E}">
+        <p14:creationId xmlns:p14="http://schemas.microsoft.com/office/powerpoint/2010/main" val="4201386572"/>
       </p:ext>
     </p:extLst>
   </p:cSld>
@@ -11036,7 +11799,7 @@
           <a:p>
             <a:r>
               <a:rPr lang="he-IL" dirty="0"/>
-              <a:t>אלגוריתם האונליין מומש בעזר,:</a:t>
+              <a:t>אלגוריתם האונליין מומש בעזרת:</a:t>
             </a:r>
           </a:p>
           <a:p>
@@ -11045,8 +11808,12 @@
               <a:buChar char="•"/>
             </a:pPr>
             <a:r>
+              <a:rPr lang="he-IL" dirty="0" err="1"/>
+              <a:t>תיכנות</a:t>
+            </a:r>
+            <a:r>
               <a:rPr lang="he-IL" dirty="0"/>
-              <a:t>,יכנו, מונחה עצמים</a:t>
+              <a:t> מונחה עצמים</a:t>
             </a:r>
           </a:p>
           <a:p>
@@ -11070,13 +11837,8 @@
             </a:pPr>
             <a:r>
               <a:rPr lang="he-IL" dirty="0"/>
-              <a:t>,יכנון </a:t>
-            </a:r>
-            <a:r>
-              <a:rPr lang="he-IL" dirty="0" err="1"/>
-              <a:t>אלגורי,מי</a:t>
-            </a:r>
-            <a:endParaRPr lang="he-IL" dirty="0"/>
+              <a:t>תיכנון אלגוריתמי</a:t>
+            </a:r>
           </a:p>
           <a:p>
             <a:pPr marL="171450" indent="-171450">
@@ -11085,7 +11847,7 @@
             </a:pPr>
             <a:r>
               <a:rPr lang="he-IL" dirty="0"/>
-              <a:t>האלגוריתם מקבל כקלט קובץ </a:t>
+              <a:t>האלגוריתם האונליין מקבל כקלט קובץ </a:t>
             </a:r>
             <a:r>
               <a:rPr lang="en-US" dirty="0"/>
@@ -11093,7 +11855,7 @@
             </a:r>
             <a:r>
               <a:rPr lang="he-IL" dirty="0"/>
-              <a:t> וגר; </a:t>
+              <a:t> וגרף </a:t>
             </a:r>
             <a:r>
               <a:rPr lang="en-US" dirty="0"/>
@@ -11101,15 +11863,7 @@
             </a:r>
             <a:r>
               <a:rPr lang="he-IL" dirty="0"/>
-              <a:t> ומוציא כפלט קובץ המכיל את סדר </a:t>
-            </a:r>
-            <a:r>
-              <a:rPr lang="he-IL" dirty="0" err="1"/>
-              <a:t>הפעולו</a:t>
-            </a:r>
-            <a:r>
-              <a:rPr lang="he-IL" dirty="0"/>
-              <a:t>, שקרו במהלך היום.</a:t>
+              <a:t> ומוציא כפלט קובץ המכיל את סדר הפעולות שקרו במהלך היום.</a:t>
             </a:r>
           </a:p>
           <a:p>
@@ -11119,31 +11873,7 @@
             </a:pPr>
             <a:r>
               <a:rPr lang="he-IL" dirty="0"/>
-              <a:t>אלגוריתם האונליין משמש ב"מגדל פיקוח" אשר שולח משימו, </a:t>
-            </a:r>
-            <a:r>
-              <a:rPr lang="he-IL" dirty="0" err="1"/>
-              <a:t>לסביב</a:t>
-            </a:r>
-            <a:r>
-              <a:rPr lang="he-IL" dirty="0"/>
-              <a:t>, ההרצה )סימולטור( ומבצע החלטו, על בסיס מצב העולם </a:t>
-            </a:r>
-            <a:r>
-              <a:rPr lang="he-IL" dirty="0" err="1"/>
-              <a:t>וההפרעו</a:t>
-            </a:r>
-            <a:r>
-              <a:rPr lang="he-IL" dirty="0"/>
-              <a:t>, </a:t>
-            </a:r>
-            <a:r>
-              <a:rPr lang="he-IL" dirty="0" err="1"/>
-              <a:t>המ,רחשו</a:t>
-            </a:r>
-            <a:r>
-              <a:rPr lang="he-IL" dirty="0"/>
-              <a:t>,/</a:t>
+              <a:t>אלגוריתם האונליין משמש כ-"מגדל פיקוח" אשר שולח משימות לסביבת ההרצה (סימולטור) ומבצע החלטות על בסיס מצב העולם וההפרעות המתרחשות.</a:t>
             </a:r>
           </a:p>
           <a:p>
@@ -11152,52 +11882,34 @@
               <a:buChar char="-"/>
             </a:pPr>
             <a:r>
+              <a:rPr lang="he-IL" dirty="0"/>
+              <a:t>האלגוריתם צריך להחליט האם הוא מבצע תיקון מקומי, תיקון גלובלי, או תכנון מחדש (במקרה </a:t>
+            </a:r>
+            <a:r>
               <a:rPr lang="he-IL" dirty="0" err="1"/>
-              <a:t>ההחלטו</a:t>
+              <a:t>שהתכנית</a:t>
             </a:r>
             <a:r>
               <a:rPr lang="he-IL" dirty="0"/>
-              <a:t>, </a:t>
+              <a:t> אינה </a:t>
             </a:r>
             <a:r>
               <a:rPr lang="he-IL" dirty="0" err="1"/>
-              <a:t>שהאלגורי,ם</a:t>
+              <a:t>פיזיבילית</a:t>
             </a:r>
             <a:r>
               <a:rPr lang="he-IL" dirty="0"/>
-              <a:t> מקבל הן האם לבצע ,</a:t>
-            </a:r>
-            <a:r>
-              <a:rPr lang="he-IL" dirty="0" err="1"/>
-              <a:t>יקון</a:t>
-            </a:r>
-            <a:r>
-              <a:rPr lang="he-IL" dirty="0"/>
-              <a:t> מקומי' האם לבצע ,</a:t>
-            </a:r>
-            <a:r>
-              <a:rPr lang="he-IL" dirty="0" err="1"/>
-              <a:t>יקון</a:t>
-            </a:r>
-            <a:r>
-              <a:rPr lang="he-IL" dirty="0"/>
-              <a:t> גלובלי ),יכנון מחדש( או האם </a:t>
-            </a:r>
-            <a:r>
-              <a:rPr lang="he-IL" dirty="0" err="1"/>
-              <a:t>ה,כני</a:t>
-            </a:r>
-            <a:r>
-              <a:rPr lang="he-IL" dirty="0"/>
-              <a:t>, אינה </a:t>
-            </a:r>
-            <a:r>
-              <a:rPr lang="he-IL" dirty="0" err="1"/>
-              <a:t>פיזיבלי</a:t>
-            </a:r>
-            <a:r>
-              <a:rPr lang="he-IL" dirty="0"/>
-              <a:t>,/</a:t>
+              <a:t>)</a:t>
+            </a:r>
+          </a:p>
+          <a:p>
+            <a:pPr marL="171450" indent="-171450">
+              <a:buFontTx/>
+              <a:buChar char="-"/>
+            </a:pPr>
+            <a:r>
+              <a:rPr lang="he-IL" b="1" dirty="0"/>
+              <a:t>האם גלובלי לא נחשב תכנון מחדש?</a:t>
             </a:r>
           </a:p>
         </p:txBody>
@@ -11575,15 +12287,7 @@
           <a:p>
             <a:r>
               <a:rPr lang="he-IL" dirty="0"/>
-              <a:t>האלגוריתם צריך להחליט האם הוא יכול לרוץ עם </a:t>
-            </a:r>
-            <a:r>
-              <a:rPr lang="he-IL" dirty="0" err="1"/>
-              <a:t>ההפרעו</a:t>
-            </a:r>
-            <a:r>
-              <a:rPr lang="he-IL" dirty="0"/>
-              <a:t>, שצצו במהלך היום או לבצע ,יכנון מחדש ביחס למצב העולם בו הוא נמצא.</a:t>
+              <a:t>האלגוריתם צריך להחליט האם הוא יכול לרוץ עם ההפרעות שצצו במהלך היום או לבצע תיכנון מחדש ביחס למצב העולם בו הוא נמצא.</a:t>
             </a:r>
           </a:p>
           <a:p>
@@ -18470,7 +19174,7 @@
           <a:p>
             <a:pPr algn="l" rtl="0"/>
             <a:r>
-              <a:rPr lang="en-US" sz="6000" b="1" i="0" kern="1200">
+              <a:rPr lang="en-US" sz="6000" b="1" i="0" kern="1200" dirty="0">
                 <a:solidFill>
                   <a:schemeClr val="tx1"/>
                 </a:solidFill>
@@ -18481,7 +19185,7 @@
               </a:rPr>
               <a:t>General schema of the problem</a:t>
             </a:r>
-            <a:endParaRPr lang="en-US" sz="6000" b="1" kern="1200">
+            <a:endParaRPr lang="en-US" sz="6000" b="1" kern="1200" dirty="0">
               <a:solidFill>
                 <a:schemeClr val="tx1"/>
               </a:solidFill>
@@ -18709,10 +19413,10 @@
       </p:sp>
       <p:pic>
         <p:nvPicPr>
-          <p:cNvPr id="4" name="תמונה 3">
+          <p:cNvPr id="7" name="תמונה 6">
             <a:extLst>
               <a:ext uri="{FF2B5EF4-FFF2-40B4-BE49-F238E27FC236}">
-                <a16:creationId xmlns:a16="http://schemas.microsoft.com/office/drawing/2014/main" id="{3927218F-0555-4053-8B8E-F796012EADA4}"/>
+                <a16:creationId xmlns:a16="http://schemas.microsoft.com/office/drawing/2014/main" id="{361A4517-EDD6-47D7-96DB-E44E58657F9B}"/>
               </a:ext>
             </a:extLst>
           </p:cNvPr>
@@ -18729,8 +19433,8 @@
         </p:blipFill>
         <p:spPr>
           <a:xfrm>
-            <a:off x="5832821" y="557360"/>
-            <a:ext cx="5224332" cy="5632704"/>
+            <a:off x="6172957" y="861336"/>
+            <a:ext cx="4544059" cy="5134692"/>
           </a:xfrm>
           <a:prstGeom prst="rect">
             <a:avLst/>
@@ -18878,10 +19582,10 @@
       </p:sp>
       <p:pic>
         <p:nvPicPr>
-          <p:cNvPr id="9" name="תמונה 8">
+          <p:cNvPr id="4" name="תמונה 3">
             <a:extLst>
               <a:ext uri="{FF2B5EF4-FFF2-40B4-BE49-F238E27FC236}">
-                <a16:creationId xmlns:a16="http://schemas.microsoft.com/office/drawing/2014/main" id="{7E0E42AA-C0FD-429F-B916-DA79AFE654E0}"/>
+                <a16:creationId xmlns:a16="http://schemas.microsoft.com/office/drawing/2014/main" id="{E510DCC6-5E2E-4A28-90BE-62809804437F}"/>
               </a:ext>
             </a:extLst>
           </p:cNvPr>
@@ -18898,8 +19602,8 @@
         </p:blipFill>
         <p:spPr>
           <a:xfrm>
-            <a:off x="970835" y="1436489"/>
-            <a:ext cx="10250330" cy="4963218"/>
+            <a:off x="959522" y="1248849"/>
+            <a:ext cx="10272956" cy="5021605"/>
           </a:xfrm>
           <a:prstGeom prst="rect">
             <a:avLst/>
@@ -23556,6 +24260,187 @@
 </file>
 
 <file path=ppt/slides/slide24.xml><?xml version="1.0" encoding="utf-8"?>
+<p:sld xmlns:a="http://schemas.openxmlformats.org/drawingml/2006/main" xmlns:r="http://schemas.openxmlformats.org/officeDocument/2006/relationships" xmlns:p="http://schemas.openxmlformats.org/presentationml/2006/main">
+  <p:cSld>
+    <p:spTree>
+      <p:nvGrpSpPr>
+        <p:cNvPr id="1" name=""/>
+        <p:cNvGrpSpPr/>
+        <p:nvPr/>
+      </p:nvGrpSpPr>
+      <p:grpSpPr>
+        <a:xfrm>
+          <a:off x="0" y="0"/>
+          <a:ext cx="0" cy="0"/>
+          <a:chOff x="0" y="0"/>
+          <a:chExt cx="0" cy="0"/>
+        </a:xfrm>
+      </p:grpSpPr>
+      <p:sp>
+        <p:nvSpPr>
+          <p:cNvPr id="2" name="כותרת 1">
+            <a:extLst>
+              <a:ext uri="{FF2B5EF4-FFF2-40B4-BE49-F238E27FC236}">
+                <a16:creationId xmlns:a16="http://schemas.microsoft.com/office/drawing/2014/main" id="{8A89DB29-573A-4FA8-BC7D-7A78F7A84C6B}"/>
+              </a:ext>
+            </a:extLst>
+          </p:cNvPr>
+          <p:cNvSpPr>
+            <a:spLocks noGrp="1"/>
+          </p:cNvSpPr>
+          <p:nvPr>
+            <p:ph type="title"/>
+          </p:nvPr>
+        </p:nvSpPr>
+        <p:spPr/>
+        <p:txBody>
+          <a:bodyPr>
+            <a:normAutofit/>
+          </a:bodyPr>
+          <a:lstStyle/>
+          <a:p>
+            <a:pPr algn="ctr"/>
+            <a:r>
+              <a:rPr lang="en-US" sz="4400" b="1" dirty="0">
+                <a:solidFill>
+                  <a:srgbClr val="002060"/>
+                </a:solidFill>
+                <a:latin typeface="Calibri Light" panose="020F0302020204030204" pitchFamily="34" charset="0"/>
+                <a:cs typeface="Calibri Light" panose="020F0302020204030204" pitchFamily="34" charset="0"/>
+              </a:rPr>
+              <a:t>Clock </a:t>
+            </a:r>
+            <a:r>
+              <a:rPr lang="en-US" b="1" i="0" dirty="0">
+                <a:solidFill>
+                  <a:srgbClr val="002060"/>
+                </a:solidFill>
+                <a:effectLst/>
+                <a:cs typeface="Assistant" pitchFamily="2" charset="-79"/>
+              </a:rPr>
+              <a:t>module</a:t>
+            </a:r>
+            <a:br>
+              <a:rPr lang="en-US" sz="1800" b="1" i="0" dirty="0">
+                <a:solidFill>
+                  <a:srgbClr val="002060"/>
+                </a:solidFill>
+                <a:effectLst/>
+                <a:cs typeface="Assistant" pitchFamily="2" charset="-79"/>
+              </a:rPr>
+            </a:br>
+            <a:r>
+              <a:rPr lang="en-US" sz="1800" b="1" dirty="0">
+                <a:solidFill>
+                  <a:srgbClr val="002060"/>
+                </a:solidFill>
+                <a:latin typeface="Calibri Light" panose="020F0302020204030204" pitchFamily="34" charset="0"/>
+                <a:cs typeface="Calibri Light" panose="020F0302020204030204" pitchFamily="34" charset="0"/>
+              </a:rPr>
+              <a:t>Problems and Solutions</a:t>
+            </a:r>
+            <a:endParaRPr lang="he-IL" sz="4400" b="1" dirty="0">
+              <a:solidFill>
+                <a:srgbClr val="002060"/>
+              </a:solidFill>
+              <a:latin typeface="Calibri Light" panose="020F0302020204030204" pitchFamily="34" charset="0"/>
+              <a:cs typeface="Calibri Light" panose="020F0302020204030204" pitchFamily="34" charset="0"/>
+            </a:endParaRPr>
+          </a:p>
+        </p:txBody>
+      </p:sp>
+      <p:sp>
+        <p:nvSpPr>
+          <p:cNvPr id="6" name="מציין מיקום טקסט 5">
+            <a:extLst>
+              <a:ext uri="{FF2B5EF4-FFF2-40B4-BE49-F238E27FC236}">
+                <a16:creationId xmlns:a16="http://schemas.microsoft.com/office/drawing/2014/main" id="{C778DE2C-6334-43CB-A106-325E2994739F}"/>
+              </a:ext>
+            </a:extLst>
+          </p:cNvPr>
+          <p:cNvSpPr>
+            <a:spLocks noGrp="1"/>
+          </p:cNvSpPr>
+          <p:nvPr>
+            <p:ph type="body" idx="4294967295"/>
+          </p:nvPr>
+        </p:nvSpPr>
+        <p:spPr>
+          <a:xfrm>
+            <a:off x="838201" y="2090057"/>
+            <a:ext cx="5705474" cy="1542143"/>
+          </a:xfrm>
+        </p:spPr>
+        <p:txBody>
+          <a:bodyPr>
+            <a:normAutofit/>
+          </a:bodyPr>
+          <a:lstStyle/>
+          <a:p>
+            <a:pPr marL="342900" indent="-342900" algn="l" rtl="0">
+              <a:buFont typeface="Arial" panose="020B0604020202020204" pitchFamily="34" charset="0"/>
+              <a:buChar char="•"/>
+            </a:pPr>
+            <a:r>
+              <a:rPr lang="en-US" sz="2400" dirty="0">
+                <a:solidFill>
+                  <a:srgbClr val="002060"/>
+                </a:solidFill>
+              </a:rPr>
+              <a:t>ZERO</a:t>
+            </a:r>
+            <a:endParaRPr lang="en-US" sz="2400" b="0" i="0" dirty="0">
+              <a:solidFill>
+                <a:srgbClr val="002060"/>
+              </a:solidFill>
+              <a:effectLst/>
+            </a:endParaRPr>
+          </a:p>
+        </p:txBody>
+      </p:sp>
+      <p:pic>
+        <p:nvPicPr>
+          <p:cNvPr id="5" name="תמונה 4">
+            <a:extLst>
+              <a:ext uri="{FF2B5EF4-FFF2-40B4-BE49-F238E27FC236}">
+                <a16:creationId xmlns:a16="http://schemas.microsoft.com/office/drawing/2014/main" id="{3150E5DF-15A5-4F52-8E9D-CB6254F71688}"/>
+              </a:ext>
+            </a:extLst>
+          </p:cNvPr>
+          <p:cNvPicPr>
+            <a:picLocks noChangeAspect="1"/>
+          </p:cNvPicPr>
+          <p:nvPr/>
+        </p:nvPicPr>
+        <p:blipFill rotWithShape="1">
+          <a:blip r:embed="rId3"/>
+          <a:srcRect b="1955"/>
+          <a:stretch/>
+        </p:blipFill>
+        <p:spPr>
+          <a:xfrm>
+            <a:off x="4735036" y="3632200"/>
+            <a:ext cx="6830378" cy="1924050"/>
+          </a:xfrm>
+          <a:prstGeom prst="rect">
+            <a:avLst/>
+          </a:prstGeom>
+        </p:spPr>
+      </p:pic>
+    </p:spTree>
+    <p:extLst>
+      <p:ext uri="{BB962C8B-B14F-4D97-AF65-F5344CB8AC3E}">
+        <p14:creationId xmlns:p14="http://schemas.microsoft.com/office/powerpoint/2010/main" val="1206695979"/>
+      </p:ext>
+    </p:extLst>
+  </p:cSld>
+  <p:clrMapOvr>
+    <a:masterClrMapping/>
+  </p:clrMapOvr>
+</p:sld>
+</file>
+
+<file path=ppt/slides/slide25.xml><?xml version="1.0" encoding="utf-8"?>
 <p:sld xmlns:a="http://schemas.openxmlformats.org/drawingml/2006/main" xmlns:r="http://schemas.openxmlformats.org/officeDocument/2006/relationships" xmlns:p="http://schemas.openxmlformats.org/presentationml/2006/main">
   <p:cSld>
     <p:spTree>
@@ -26147,7 +27032,7 @@
 </p:sld>
 </file>
 
-<file path=ppt/slides/slide25.xml><?xml version="1.0" encoding="utf-8"?>
+<file path=ppt/slides/slide26.xml><?xml version="1.0" encoding="utf-8"?>
 <p:sld xmlns:a="http://schemas.openxmlformats.org/drawingml/2006/main" xmlns:r="http://schemas.openxmlformats.org/officeDocument/2006/relationships" xmlns:p="http://schemas.openxmlformats.org/presentationml/2006/main">
   <p:cSld>
     <p:spTree>
@@ -26527,176 +27412,6 @@
 </p:sld>
 </file>
 
-<file path=ppt/slides/slide26.xml><?xml version="1.0" encoding="utf-8"?>
-<p:sld xmlns:a="http://schemas.openxmlformats.org/drawingml/2006/main" xmlns:r="http://schemas.openxmlformats.org/officeDocument/2006/relationships" xmlns:p="http://schemas.openxmlformats.org/presentationml/2006/main">
-  <p:cSld>
-    <p:spTree>
-      <p:nvGrpSpPr>
-        <p:cNvPr id="1" name=""/>
-        <p:cNvGrpSpPr/>
-        <p:nvPr/>
-      </p:nvGrpSpPr>
-      <p:grpSpPr>
-        <a:xfrm>
-          <a:off x="0" y="0"/>
-          <a:ext cx="0" cy="0"/>
-          <a:chOff x="0" y="0"/>
-          <a:chExt cx="0" cy="0"/>
-        </a:xfrm>
-      </p:grpSpPr>
-      <p:sp>
-        <p:nvSpPr>
-          <p:cNvPr id="2" name="כותרת 1">
-            <a:extLst>
-              <a:ext uri="{FF2B5EF4-FFF2-40B4-BE49-F238E27FC236}">
-                <a16:creationId xmlns:a16="http://schemas.microsoft.com/office/drawing/2014/main" id="{8A89DB29-573A-4FA8-BC7D-7A78F7A84C6B}"/>
-              </a:ext>
-            </a:extLst>
-          </p:cNvPr>
-          <p:cNvSpPr>
-            <a:spLocks noGrp="1"/>
-          </p:cNvSpPr>
-          <p:nvPr>
-            <p:ph type="title"/>
-          </p:nvPr>
-        </p:nvSpPr>
-        <p:spPr/>
-        <p:txBody>
-          <a:bodyPr>
-            <a:normAutofit/>
-          </a:bodyPr>
-          <a:lstStyle/>
-          <a:p>
-            <a:pPr algn="ctr"/>
-            <a:r>
-              <a:rPr lang="en-US" sz="4400" b="1" dirty="0">
-                <a:solidFill>
-                  <a:srgbClr val="002060"/>
-                </a:solidFill>
-                <a:latin typeface="Calibri Light" panose="020F0302020204030204" pitchFamily="34" charset="0"/>
-                <a:cs typeface="Calibri Light" panose="020F0302020204030204" pitchFamily="34" charset="0"/>
-              </a:rPr>
-              <a:t>Interrupt</a:t>
-            </a:r>
-            <a:r>
-              <a:rPr lang="en-US" b="1" i="0" dirty="0">
-                <a:solidFill>
-                  <a:srgbClr val="002060"/>
-                </a:solidFill>
-                <a:effectLst/>
-                <a:cs typeface="Assistant" pitchFamily="2" charset="-79"/>
-              </a:rPr>
-              <a:t> module</a:t>
-            </a:r>
-            <a:endParaRPr lang="he-IL" sz="4400" b="1" dirty="0">
-              <a:solidFill>
-                <a:srgbClr val="002060"/>
-              </a:solidFill>
-              <a:latin typeface="Calibri Light" panose="020F0302020204030204" pitchFamily="34" charset="0"/>
-              <a:cs typeface="Calibri Light" panose="020F0302020204030204" pitchFamily="34" charset="0"/>
-            </a:endParaRPr>
-          </a:p>
-        </p:txBody>
-      </p:sp>
-      <p:sp>
-        <p:nvSpPr>
-          <p:cNvPr id="6" name="מציין מיקום טקסט 5">
-            <a:extLst>
-              <a:ext uri="{FF2B5EF4-FFF2-40B4-BE49-F238E27FC236}">
-                <a16:creationId xmlns:a16="http://schemas.microsoft.com/office/drawing/2014/main" id="{C778DE2C-6334-43CB-A106-325E2994739F}"/>
-              </a:ext>
-            </a:extLst>
-          </p:cNvPr>
-          <p:cNvSpPr>
-            <a:spLocks noGrp="1"/>
-          </p:cNvSpPr>
-          <p:nvPr>
-            <p:ph type="body" idx="4294967295"/>
-          </p:nvPr>
-        </p:nvSpPr>
-        <p:spPr>
-          <a:xfrm>
-            <a:off x="838201" y="2090057"/>
-            <a:ext cx="4330700" cy="1542143"/>
-          </a:xfrm>
-        </p:spPr>
-        <p:txBody>
-          <a:bodyPr/>
-          <a:lstStyle/>
-          <a:p>
-            <a:pPr marL="342900" indent="-342900" algn="l" rtl="0">
-              <a:buFont typeface="Arial" panose="020B0604020202020204" pitchFamily="34" charset="0"/>
-              <a:buChar char="•"/>
-            </a:pPr>
-            <a:r>
-              <a:rPr lang="en-US" sz="2400" dirty="0">
-                <a:solidFill>
-                  <a:srgbClr val="002060"/>
-                </a:solidFill>
-              </a:rPr>
-              <a:t>Action count, duration</a:t>
-            </a:r>
-            <a:endParaRPr lang="he-IL" sz="2400" b="0" i="0" dirty="0">
-              <a:solidFill>
-                <a:srgbClr val="002060"/>
-              </a:solidFill>
-              <a:effectLst/>
-            </a:endParaRPr>
-          </a:p>
-          <a:p>
-            <a:pPr marL="342900" indent="-342900" algn="l" rtl="0">
-              <a:buFont typeface="Arial" panose="020B0604020202020204" pitchFamily="34" charset="0"/>
-              <a:buChar char="•"/>
-            </a:pPr>
-            <a:r>
-              <a:rPr lang="en-US" sz="2400" dirty="0">
-                <a:solidFill>
-                  <a:srgbClr val="002060"/>
-                </a:solidFill>
-              </a:rPr>
-              <a:t>Holds ref to: Clock, Events</a:t>
-            </a:r>
-          </a:p>
-          <a:p>
-            <a:pPr marL="342900" indent="-342900" algn="l" rtl="0">
-              <a:buFont typeface="Arial" panose="020B0604020202020204" pitchFamily="34" charset="0"/>
-              <a:buChar char="•"/>
-            </a:pPr>
-            <a:r>
-              <a:rPr lang="en-US" sz="2400" dirty="0">
-                <a:solidFill>
-                  <a:srgbClr val="002060"/>
-                </a:solidFill>
-              </a:rPr>
-              <a:t>Listen to: Controller</a:t>
-            </a:r>
-          </a:p>
-          <a:p>
-            <a:pPr marL="342900" indent="-342900" algn="l" rtl="0">
-              <a:buFont typeface="Arial" panose="020B0604020202020204" pitchFamily="34" charset="0"/>
-              <a:buChar char="•"/>
-            </a:pPr>
-            <a:endParaRPr lang="en-US" dirty="0">
-              <a:solidFill>
-                <a:srgbClr val="002060"/>
-              </a:solidFill>
-            </a:endParaRPr>
-          </a:p>
-        </p:txBody>
-      </p:sp>
-    </p:spTree>
-    <p:extLst>
-      <p:ext uri="{BB962C8B-B14F-4D97-AF65-F5344CB8AC3E}">
-        <p14:creationId xmlns:p14="http://schemas.microsoft.com/office/powerpoint/2010/main" val="1450417377"/>
-      </p:ext>
-    </p:extLst>
-  </p:cSld>
-  <p:clrMapOvr>
-    <a:masterClrMapping/>
-  </p:clrMapOvr>
-</p:sld>
-</file>
-
 <file path=ppt/slides/slide27.xml><?xml version="1.0" encoding="utf-8"?>
 <p:sld xmlns:a="http://schemas.openxmlformats.org/drawingml/2006/main" xmlns:r="http://schemas.openxmlformats.org/officeDocument/2006/relationships" xmlns:p="http://schemas.openxmlformats.org/presentationml/2006/main">
   <p:cSld>
@@ -26719,7 +27434,7 @@
           <p:cNvPr id="2" name="כותרת 1">
             <a:extLst>
               <a:ext uri="{FF2B5EF4-FFF2-40B4-BE49-F238E27FC236}">
-                <a16:creationId xmlns:a16="http://schemas.microsoft.com/office/drawing/2014/main" id="{88D98B86-C5B7-4A01-8E43-ECD04D8869D6}"/>
+                <a16:creationId xmlns:a16="http://schemas.microsoft.com/office/drawing/2014/main" id="{8A89DB29-573A-4FA8-BC7D-7A78F7A84C6B}"/>
               </a:ext>
             </a:extLst>
           </p:cNvPr>
@@ -26732,19 +27447,48 @@
         </p:nvSpPr>
         <p:spPr/>
         <p:txBody>
-          <a:bodyPr/>
+          <a:bodyPr>
+            <a:normAutofit/>
+          </a:bodyPr>
           <a:lstStyle/>
           <a:p>
-            <a:endParaRPr lang="he-IL" dirty="0"/>
+            <a:pPr algn="ctr"/>
+            <a:r>
+              <a:rPr lang="en-US" sz="4400" b="1" dirty="0">
+                <a:solidFill>
+                  <a:srgbClr val="002060"/>
+                </a:solidFill>
+                <a:latin typeface="Calibri Light" panose="020F0302020204030204" pitchFamily="34" charset="0"/>
+                <a:cs typeface="Calibri Light" panose="020F0302020204030204" pitchFamily="34" charset="0"/>
+              </a:rPr>
+              <a:t>Interrupt</a:t>
+            </a:r>
+            <a:r>
+              <a:rPr lang="en-US" b="1" i="0" dirty="0">
+                <a:solidFill>
+                  <a:srgbClr val="002060"/>
+                </a:solidFill>
+                <a:effectLst/>
+                <a:cs typeface="Assistant" pitchFamily="2" charset="-79"/>
+              </a:rPr>
+              <a:t> module</a:t>
+            </a:r>
+            <a:endParaRPr lang="he-IL" sz="4400" b="1" dirty="0">
+              <a:solidFill>
+                <a:srgbClr val="002060"/>
+              </a:solidFill>
+              <a:latin typeface="Calibri Light" panose="020F0302020204030204" pitchFamily="34" charset="0"/>
+              <a:cs typeface="Calibri Light" panose="020F0302020204030204" pitchFamily="34" charset="0"/>
+            </a:endParaRPr>
           </a:p>
         </p:txBody>
       </p:sp>
       <p:sp>
         <p:nvSpPr>
-          <p:cNvPr id="3" name="מציין מיקום טקסט 2">
+          <p:cNvPr id="6" name="מציין מיקום טקסט 5">
             <a:extLst>
               <a:ext uri="{FF2B5EF4-FFF2-40B4-BE49-F238E27FC236}">
-                <a16:creationId xmlns:a16="http://schemas.microsoft.com/office/drawing/2014/main" id="{E6B91886-07E7-4C81-9AAF-69D8F8D5C895}"/>
+                <a16:creationId xmlns:a16="http://schemas.microsoft.com/office/drawing/2014/main" id="{C778DE2C-6334-43CB-A106-325E2994739F}"/>
               </a:ext>
             </a:extLst>
           </p:cNvPr>
@@ -26752,30 +27496,83 @@
             <a:spLocks noGrp="1"/>
           </p:cNvSpPr>
           <p:nvPr>
-            <p:ph type="body" idx="1"/>
-          </p:nvPr>
-        </p:nvSpPr>
-        <p:spPr/>
+            <p:ph type="body" idx="4294967295"/>
+          </p:nvPr>
+        </p:nvSpPr>
+        <p:spPr>
+          <a:xfrm>
+            <a:off x="838201" y="2090057"/>
+            <a:ext cx="4330700" cy="1542143"/>
+          </a:xfrm>
+        </p:spPr>
         <p:txBody>
           <a:bodyPr/>
           <a:lstStyle/>
           <a:p>
-            <a:r>
-              <a:rPr lang="he-IL" dirty="0"/>
-              <a:t>תוצאות – </a:t>
-            </a:r>
-            <a:r>
-              <a:rPr lang="en-US" dirty="0"/>
-              <a:t>log output</a:t>
-            </a:r>
-            <a:endParaRPr lang="he-IL" dirty="0"/>
+            <a:pPr marL="342900" indent="-342900" algn="l" rtl="0">
+              <a:buFont typeface="Arial" panose="020B0604020202020204" pitchFamily="34" charset="0"/>
+              <a:buChar char="•"/>
+            </a:pPr>
+            <a:r>
+              <a:rPr lang="en-US" sz="2400" dirty="0">
+                <a:solidFill>
+                  <a:srgbClr val="002060"/>
+                </a:solidFill>
+              </a:rPr>
+              <a:t>Action count, duration</a:t>
+            </a:r>
+            <a:endParaRPr lang="he-IL" sz="2400" b="0" i="0" dirty="0">
+              <a:solidFill>
+                <a:srgbClr val="002060"/>
+              </a:solidFill>
+              <a:effectLst/>
+            </a:endParaRPr>
+          </a:p>
+          <a:p>
+            <a:pPr marL="342900" indent="-342900" algn="l" rtl="0">
+              <a:buFont typeface="Arial" panose="020B0604020202020204" pitchFamily="34" charset="0"/>
+              <a:buChar char="•"/>
+            </a:pPr>
+            <a:r>
+              <a:rPr lang="en-US" sz="2400" dirty="0">
+                <a:solidFill>
+                  <a:srgbClr val="002060"/>
+                </a:solidFill>
+              </a:rPr>
+              <a:t>Holds ref to: Clock, Events</a:t>
+            </a:r>
+          </a:p>
+          <a:p>
+            <a:pPr marL="342900" indent="-342900" algn="l" rtl="0">
+              <a:buFont typeface="Arial" panose="020B0604020202020204" pitchFamily="34" charset="0"/>
+              <a:buChar char="•"/>
+            </a:pPr>
+            <a:r>
+              <a:rPr lang="en-US" sz="2400" dirty="0">
+                <a:solidFill>
+                  <a:srgbClr val="002060"/>
+                </a:solidFill>
+              </a:rPr>
+              <a:t>Listen to: Controller</a:t>
+            </a:r>
+          </a:p>
+          <a:p>
+            <a:pPr marL="342900" indent="-342900" algn="l" rtl="0">
+              <a:buFont typeface="Arial" panose="020B0604020202020204" pitchFamily="34" charset="0"/>
+              <a:buChar char="•"/>
+            </a:pPr>
+            <a:endParaRPr lang="en-US" dirty="0">
+              <a:solidFill>
+                <a:srgbClr val="002060"/>
+              </a:solidFill>
+            </a:endParaRPr>
           </a:p>
         </p:txBody>
       </p:sp>
     </p:spTree>
     <p:extLst>
       <p:ext uri="{BB962C8B-B14F-4D97-AF65-F5344CB8AC3E}">
-        <p14:creationId xmlns:p14="http://schemas.microsoft.com/office/powerpoint/2010/main" val="2659655321"/>
+        <p14:creationId xmlns:p14="http://schemas.microsoft.com/office/powerpoint/2010/main" val="1450417377"/>
       </p:ext>
     </p:extLst>
   </p:cSld>
@@ -26863,7 +27660,7 @@
     </p:spTree>
     <p:extLst>
       <p:ext uri="{BB962C8B-B14F-4D97-AF65-F5344CB8AC3E}">
-        <p14:creationId xmlns:p14="http://schemas.microsoft.com/office/powerpoint/2010/main" val="2265013049"/>
+        <p14:creationId xmlns:p14="http://schemas.microsoft.com/office/powerpoint/2010/main" val="2659655321"/>
       </p:ext>
     </p:extLst>
   </p:cSld>
@@ -26895,7 +27692,7 @@
           <p:cNvPr id="2" name="כותרת 1">
             <a:extLst>
               <a:ext uri="{FF2B5EF4-FFF2-40B4-BE49-F238E27FC236}">
-                <a16:creationId xmlns:a16="http://schemas.microsoft.com/office/drawing/2014/main" id="{8A89DB29-573A-4FA8-BC7D-7A78F7A84C6B}"/>
+                <a16:creationId xmlns:a16="http://schemas.microsoft.com/office/drawing/2014/main" id="{88D98B86-C5B7-4A01-8E43-ECD04D8869D6}"/>
               </a:ext>
             </a:extLst>
           </p:cNvPr>
@@ -26908,36 +27705,19 @@
         </p:nvSpPr>
         <p:spPr/>
         <p:txBody>
-          <a:bodyPr>
-            <a:normAutofit/>
-          </a:bodyPr>
+          <a:bodyPr/>
           <a:lstStyle/>
           <a:p>
-            <a:pPr algn="ctr"/>
-            <a:r>
-              <a:rPr lang="en-US" b="1" dirty="0">
-                <a:solidFill>
-                  <a:srgbClr val="002060"/>
-                </a:solidFill>
-              </a:rPr>
-              <a:t>Future Work</a:t>
-            </a:r>
-            <a:endParaRPr lang="he-IL" sz="4400" b="1" dirty="0">
-              <a:solidFill>
-                <a:srgbClr val="002060"/>
-              </a:solidFill>
-              <a:latin typeface="Calibri Light" panose="020F0302020204030204" pitchFamily="34" charset="0"/>
-              <a:cs typeface="Calibri Light" panose="020F0302020204030204" pitchFamily="34" charset="0"/>
-            </a:endParaRPr>
+            <a:endParaRPr lang="he-IL" dirty="0"/>
           </a:p>
         </p:txBody>
       </p:sp>
       <p:sp>
         <p:nvSpPr>
-          <p:cNvPr id="6" name="מציין מיקום טקסט 5">
+          <p:cNvPr id="3" name="מציין מיקום טקסט 2">
             <a:extLst>
               <a:ext uri="{FF2B5EF4-FFF2-40B4-BE49-F238E27FC236}">
-                <a16:creationId xmlns:a16="http://schemas.microsoft.com/office/drawing/2014/main" id="{C778DE2C-6334-43CB-A106-325E2994739F}"/>
+                <a16:creationId xmlns:a16="http://schemas.microsoft.com/office/drawing/2014/main" id="{E6B91886-07E7-4C81-9AAF-69D8F8D5C895}"/>
               </a:ext>
             </a:extLst>
           </p:cNvPr>
@@ -26945,99 +27725,30 @@
             <a:spLocks noGrp="1"/>
           </p:cNvSpPr>
           <p:nvPr>
-            <p:ph type="body" idx="4294967295"/>
-          </p:nvPr>
-        </p:nvSpPr>
-        <p:spPr>
-          <a:xfrm>
-            <a:off x="838200" y="2090057"/>
-            <a:ext cx="9713685" cy="2072368"/>
-          </a:xfrm>
-        </p:spPr>
+            <p:ph type="body" idx="1"/>
+          </p:nvPr>
+        </p:nvSpPr>
+        <p:spPr/>
         <p:txBody>
-          <a:bodyPr>
-            <a:normAutofit/>
-          </a:bodyPr>
+          <a:bodyPr/>
           <a:lstStyle/>
           <a:p>
-            <a:pPr marL="342900" indent="-342900" algn="l" rtl="0">
-              <a:buFont typeface="Arial" panose="020B0604020202020204" pitchFamily="34" charset="0"/>
-              <a:buChar char="•"/>
-            </a:pPr>
-            <a:r>
-              <a:rPr lang="en-US" sz="2400" b="0" i="0" dirty="0">
-                <a:solidFill>
-                  <a:srgbClr val="002060"/>
-                </a:solidFill>
-                <a:effectLst/>
-                <a:cs typeface="Assistant" pitchFamily="2" charset="-79"/>
-              </a:rPr>
-              <a:t>Add more types of interruptions</a:t>
-            </a:r>
-          </a:p>
-          <a:p>
-            <a:pPr marL="342900" indent="-342900" algn="l" rtl="0">
-              <a:buFont typeface="Arial" panose="020B0604020202020204" pitchFamily="34" charset="0"/>
-              <a:buChar char="•"/>
-            </a:pPr>
-            <a:r>
-              <a:rPr lang="en-US" sz="2400" b="0" i="0" dirty="0">
-                <a:solidFill>
-                  <a:srgbClr val="002060"/>
-                </a:solidFill>
-                <a:effectLst/>
-                <a:cs typeface="Assistant" pitchFamily="2" charset="-79"/>
-              </a:rPr>
-              <a:t>A</a:t>
-            </a:r>
-            <a:r>
-              <a:rPr lang="en-US" sz="2400" dirty="0">
-                <a:solidFill>
-                  <a:srgbClr val="002060"/>
-                </a:solidFill>
-                <a:cs typeface="Assistant" pitchFamily="2" charset="-79"/>
-              </a:rPr>
-              <a:t>dd a GUI</a:t>
-            </a:r>
-            <a:endParaRPr lang="he-IL" sz="2400" dirty="0">
-              <a:solidFill>
-                <a:srgbClr val="002060"/>
-              </a:solidFill>
-              <a:cs typeface="Assistant" pitchFamily="2" charset="-79"/>
-            </a:endParaRPr>
-          </a:p>
-          <a:p>
-            <a:pPr marL="342900" indent="-342900" algn="l" rtl="0">
-              <a:buFont typeface="Arial" panose="020B0604020202020204" pitchFamily="34" charset="0"/>
-              <a:buChar char="•"/>
-            </a:pPr>
-            <a:r>
-              <a:rPr lang="en-US" sz="2400" b="0" i="0" dirty="0">
-                <a:solidFill>
-                  <a:srgbClr val="002060"/>
-                </a:solidFill>
-                <a:effectLst/>
-                <a:cs typeface="Assistant" pitchFamily="2" charset="-79"/>
-              </a:rPr>
-              <a:t>Make the system interactive</a:t>
-            </a:r>
-          </a:p>
-          <a:p>
-            <a:pPr marL="0" indent="0" algn="l" rtl="0">
-              <a:buNone/>
-            </a:pPr>
-            <a:endParaRPr lang="en-US" dirty="0">
-              <a:solidFill>
-                <a:srgbClr val="002060"/>
-              </a:solidFill>
-            </a:endParaRPr>
+            <a:r>
+              <a:rPr lang="he-IL" dirty="0"/>
+              <a:t>תוצאות – </a:t>
+            </a:r>
+            <a:r>
+              <a:rPr lang="en-US" dirty="0"/>
+              <a:t>log output</a:t>
+            </a:r>
+            <a:endParaRPr lang="he-IL" dirty="0"/>
           </a:p>
         </p:txBody>
       </p:sp>
     </p:spTree>
     <p:extLst>
       <p:ext uri="{BB962C8B-B14F-4D97-AF65-F5344CB8AC3E}">
-        <p14:creationId xmlns:p14="http://schemas.microsoft.com/office/powerpoint/2010/main" val="3853127531"/>
+        <p14:creationId xmlns:p14="http://schemas.microsoft.com/office/powerpoint/2010/main" val="2265013049"/>
       </p:ext>
     </p:extLst>
   </p:cSld>
@@ -27124,7 +27835,7 @@
         <p:spPr>
           <a:xfrm>
             <a:off x="1266824" y="1926590"/>
-            <a:ext cx="9648825" cy="3139321"/>
+            <a:ext cx="9648825" cy="3693319"/>
           </a:xfrm>
           <a:prstGeom prst="rect">
             <a:avLst/>
@@ -27150,6 +27861,18 @@
               </a:rPr>
               <a:t>Building a day plan and monitoring it in real time is a complex problem.</a:t>
             </a:r>
+          </a:p>
+          <a:p>
+            <a:pPr algn="l" rtl="0">
+              <a:lnSpc>
+                <a:spcPct val="150000"/>
+              </a:lnSpc>
+            </a:pPr>
+            <a:endParaRPr lang="en-US" sz="2400" dirty="0">
+              <a:solidFill>
+                <a:srgbClr val="002060"/>
+              </a:solidFill>
+            </a:endParaRPr>
           </a:p>
           <a:p>
             <a:pPr algn="l" rtl="0">
@@ -27342,6 +28065,180 @@
 </file>
 
 <file path=ppt/slides/slide30.xml><?xml version="1.0" encoding="utf-8"?>
+<p:sld xmlns:a="http://schemas.openxmlformats.org/drawingml/2006/main" xmlns:r="http://schemas.openxmlformats.org/officeDocument/2006/relationships" xmlns:p="http://schemas.openxmlformats.org/presentationml/2006/main">
+  <p:cSld>
+    <p:spTree>
+      <p:nvGrpSpPr>
+        <p:cNvPr id="1" name=""/>
+        <p:cNvGrpSpPr/>
+        <p:nvPr/>
+      </p:nvGrpSpPr>
+      <p:grpSpPr>
+        <a:xfrm>
+          <a:off x="0" y="0"/>
+          <a:ext cx="0" cy="0"/>
+          <a:chOff x="0" y="0"/>
+          <a:chExt cx="0" cy="0"/>
+        </a:xfrm>
+      </p:grpSpPr>
+      <p:sp>
+        <p:nvSpPr>
+          <p:cNvPr id="2" name="כותרת 1">
+            <a:extLst>
+              <a:ext uri="{FF2B5EF4-FFF2-40B4-BE49-F238E27FC236}">
+                <a16:creationId xmlns:a16="http://schemas.microsoft.com/office/drawing/2014/main" id="{8A89DB29-573A-4FA8-BC7D-7A78F7A84C6B}"/>
+              </a:ext>
+            </a:extLst>
+          </p:cNvPr>
+          <p:cNvSpPr>
+            <a:spLocks noGrp="1"/>
+          </p:cNvSpPr>
+          <p:nvPr>
+            <p:ph type="title"/>
+          </p:nvPr>
+        </p:nvSpPr>
+        <p:spPr/>
+        <p:txBody>
+          <a:bodyPr>
+            <a:normAutofit/>
+          </a:bodyPr>
+          <a:lstStyle/>
+          <a:p>
+            <a:pPr algn="ctr"/>
+            <a:r>
+              <a:rPr lang="en-US" b="1" dirty="0">
+                <a:solidFill>
+                  <a:srgbClr val="002060"/>
+                </a:solidFill>
+              </a:rPr>
+              <a:t>Future Work</a:t>
+            </a:r>
+            <a:endParaRPr lang="he-IL" sz="4400" b="1" dirty="0">
+              <a:solidFill>
+                <a:srgbClr val="002060"/>
+              </a:solidFill>
+              <a:latin typeface="Calibri Light" panose="020F0302020204030204" pitchFamily="34" charset="0"/>
+              <a:cs typeface="Calibri Light" panose="020F0302020204030204" pitchFamily="34" charset="0"/>
+            </a:endParaRPr>
+          </a:p>
+        </p:txBody>
+      </p:sp>
+      <p:sp>
+        <p:nvSpPr>
+          <p:cNvPr id="6" name="מציין מיקום טקסט 5">
+            <a:extLst>
+              <a:ext uri="{FF2B5EF4-FFF2-40B4-BE49-F238E27FC236}">
+                <a16:creationId xmlns:a16="http://schemas.microsoft.com/office/drawing/2014/main" id="{C778DE2C-6334-43CB-A106-325E2994739F}"/>
+              </a:ext>
+            </a:extLst>
+          </p:cNvPr>
+          <p:cNvSpPr>
+            <a:spLocks noGrp="1"/>
+          </p:cNvSpPr>
+          <p:nvPr>
+            <p:ph type="body" idx="4294967295"/>
+          </p:nvPr>
+        </p:nvSpPr>
+        <p:spPr>
+          <a:xfrm>
+            <a:off x="838200" y="2090057"/>
+            <a:ext cx="9713685" cy="2072368"/>
+          </a:xfrm>
+        </p:spPr>
+        <p:txBody>
+          <a:bodyPr>
+            <a:normAutofit/>
+          </a:bodyPr>
+          <a:lstStyle/>
+          <a:p>
+            <a:pPr marL="342900" indent="-342900" algn="l" rtl="0">
+              <a:buFont typeface="Arial" panose="020B0604020202020204" pitchFamily="34" charset="0"/>
+              <a:buChar char="•"/>
+            </a:pPr>
+            <a:r>
+              <a:rPr lang="en-US" sz="2400" b="0" i="0" dirty="0">
+                <a:solidFill>
+                  <a:srgbClr val="002060"/>
+                </a:solidFill>
+                <a:effectLst/>
+                <a:cs typeface="Assistant" pitchFamily="2" charset="-79"/>
+              </a:rPr>
+              <a:t>Add more types of interruptions</a:t>
+            </a:r>
+          </a:p>
+          <a:p>
+            <a:pPr marL="342900" indent="-342900" algn="l" rtl="0">
+              <a:buFont typeface="Arial" panose="020B0604020202020204" pitchFamily="34" charset="0"/>
+              <a:buChar char="•"/>
+            </a:pPr>
+            <a:r>
+              <a:rPr lang="en-US" sz="2400" b="0" i="0" dirty="0">
+                <a:solidFill>
+                  <a:srgbClr val="002060"/>
+                </a:solidFill>
+                <a:effectLst/>
+                <a:cs typeface="Assistant" pitchFamily="2" charset="-79"/>
+              </a:rPr>
+              <a:t>A</a:t>
+            </a:r>
+            <a:r>
+              <a:rPr lang="en-US" sz="2400" dirty="0">
+                <a:solidFill>
+                  <a:srgbClr val="002060"/>
+                </a:solidFill>
+                <a:cs typeface="Assistant" pitchFamily="2" charset="-79"/>
+              </a:rPr>
+              <a:t>dd a GUI</a:t>
+            </a:r>
+            <a:endParaRPr lang="he-IL" sz="2400" dirty="0">
+              <a:solidFill>
+                <a:srgbClr val="002060"/>
+              </a:solidFill>
+              <a:cs typeface="Assistant" pitchFamily="2" charset="-79"/>
+            </a:endParaRPr>
+          </a:p>
+          <a:p>
+            <a:pPr marL="342900" indent="-342900" algn="l" rtl="0">
+              <a:buFont typeface="Arial" panose="020B0604020202020204" pitchFamily="34" charset="0"/>
+              <a:buChar char="•"/>
+            </a:pPr>
+            <a:r>
+              <a:rPr lang="en-US" sz="2400" b="0" i="0" dirty="0">
+                <a:solidFill>
+                  <a:srgbClr val="002060"/>
+                </a:solidFill>
+                <a:effectLst/>
+                <a:cs typeface="Assistant" pitchFamily="2" charset="-79"/>
+              </a:rPr>
+              <a:t>Make the system interactive</a:t>
+            </a:r>
+          </a:p>
+          <a:p>
+            <a:pPr marL="0" indent="0" algn="l" rtl="0">
+              <a:buNone/>
+            </a:pPr>
+            <a:endParaRPr lang="en-US" dirty="0">
+              <a:solidFill>
+                <a:srgbClr val="002060"/>
+              </a:solidFill>
+            </a:endParaRPr>
+          </a:p>
+        </p:txBody>
+      </p:sp>
+    </p:spTree>
+    <p:extLst>
+      <p:ext uri="{BB962C8B-B14F-4D97-AF65-F5344CB8AC3E}">
+        <p14:creationId xmlns:p14="http://schemas.microsoft.com/office/powerpoint/2010/main" val="3853127531"/>
+      </p:ext>
+    </p:extLst>
+  </p:cSld>
+  <p:clrMapOvr>
+    <a:masterClrMapping/>
+  </p:clrMapOvr>
+</p:sld>
+</file>
+
+<file path=ppt/slides/slide31.xml><?xml version="1.0" encoding="utf-8"?>
 <p:sld xmlns:a="http://schemas.openxmlformats.org/drawingml/2006/main" xmlns:r="http://schemas.openxmlformats.org/officeDocument/2006/relationships" xmlns:p="http://schemas.openxmlformats.org/presentationml/2006/main">
   <p:cSld>
     <p:spTree>
@@ -28452,13 +29349,22 @@
               <a:buChar char="o"/>
             </a:pPr>
             <a:r>
+              <a:rPr lang="en-US" sz="2200" strike="sngStrike" dirty="0">
+                <a:solidFill>
+                  <a:srgbClr val="002060"/>
+                </a:solidFill>
+                <a:cs typeface="Arial" panose="020B0604020202020204" pitchFamily="34" charset="0"/>
+              </a:rPr>
+              <a:t>In our project we build an online algorithm which follow a plan generated by the offline algorithm. </a:t>
+            </a:r>
+            <a:r>
               <a:rPr lang="en-US" sz="2200" dirty="0">
                 <a:solidFill>
                   <a:srgbClr val="002060"/>
                 </a:solidFill>
                 <a:cs typeface="Arial" panose="020B0604020202020204" pitchFamily="34" charset="0"/>
               </a:rPr>
-              <a:t>In our project we build an online algorithm which follow a plan generated by the offline algorithm. Our algorithm ran the offline plan w</a:t>
+              <a:t>Our algorithm ran the offline plan w</a:t>
             </a:r>
             <a:r>
               <a:rPr lang="en-US" sz="2200" b="0" i="0" dirty="0">

</xml_diff>